<commit_message>
ADD: bpmn / MOD: ppt, mapa de empatia
</commit_message>
<xml_diff>
--- a/Documentação/Mapa de Empatia.pptx
+++ b/Documentação/Mapa de Empatia.pptx
@@ -5,10 +5,10 @@
     <p:sldMasterId id="2147483648" r:id="rId1"/>
   </p:sldMasterIdLst>
   <p:notesMasterIdLst>
-    <p:notesMasterId r:id="rId4"/>
+    <p:notesMasterId r:id="rId3"/>
   </p:notesMasterIdLst>
   <p:sldIdLst>
-    <p:sldId id="256" r:id="rId3"/>
+    <p:sldId id="256" r:id="rId2"/>
   </p:sldIdLst>
   <p:sldSz cx="12192000" cy="6858000"/>
   <p:notesSz cx="6858000" cy="9144000"/>
@@ -107,6 +107,11 @@
       </a:defRPr>
     </a:lvl9pPr>
   </p:defaultTextStyle>
+  <p:extLst>
+    <p:ext uri="{EFAFB233-063F-42B5-8137-9DF3F51BA10A}">
+      <p15:sldGuideLst xmlns:p15="http://schemas.microsoft.com/office/powerpoint/2012/main"/>
+    </p:ext>
+  </p:extLst>
 </p:presentation>
 </file>
 
@@ -192,6 +197,7 @@
           <a:p>
             <a:fld id="{3EFD42F7-718C-4B98-AAEC-167E6DDD60A7}" type="datetimeFigureOut">
               <a:rPr lang="en-US" smtClean="0"/>
+              <a:t>3/6/2020</a:t>
             </a:fld>
             <a:endParaRPr lang="en-US"/>
           </a:p>
@@ -255,42 +261,37 @@
           <a:p>
             <a:pPr lvl="0"/>
             <a:r>
-              <a:rPr lang="en-US" smtClean="0"/>
+              <a:rPr lang="en-US"/>
               <a:t>Click to edit Master text styles</a:t>
             </a:r>
-            <a:endParaRPr lang="en-US" smtClean="0"/>
           </a:p>
           <a:p>
             <a:pPr lvl="1"/>
             <a:r>
-              <a:rPr lang="en-US" smtClean="0"/>
+              <a:rPr lang="en-US"/>
               <a:t>Second level</a:t>
             </a:r>
-            <a:endParaRPr lang="en-US" smtClean="0"/>
           </a:p>
           <a:p>
             <a:pPr lvl="2"/>
             <a:r>
-              <a:rPr lang="en-US" smtClean="0"/>
+              <a:rPr lang="en-US"/>
               <a:t>Third level</a:t>
             </a:r>
-            <a:endParaRPr lang="en-US" smtClean="0"/>
           </a:p>
           <a:p>
             <a:pPr lvl="3"/>
             <a:r>
-              <a:rPr lang="en-US" smtClean="0"/>
+              <a:rPr lang="en-US"/>
               <a:t>Fourth level</a:t>
             </a:r>
-            <a:endParaRPr lang="en-US" smtClean="0"/>
           </a:p>
           <a:p>
             <a:pPr lvl="4"/>
             <a:r>
-              <a:rPr lang="en-US" smtClean="0"/>
+              <a:rPr lang="en-US"/>
               <a:t>Fifth level</a:t>
             </a:r>
-            <a:endParaRPr lang="en-US"/>
           </a:p>
         </p:txBody>
       </p:sp>
@@ -354,6 +355,7 @@
           <a:p>
             <a:fld id="{21B2AA4F-B828-4D7C-AFD3-893933DAFCB4}" type="slidenum">
               <a:rPr lang="en-US" smtClean="0"/>
+              <a:t>‹nº›</a:t>
             </a:fld>
             <a:endParaRPr lang="en-US"/>
           </a:p>
@@ -466,11 +468,20 @@
         <p:cNvGrpSpPr/>
         <p:nvPr/>
       </p:nvGrpSpPr>
-      <p:grpSpPr/>
+      <p:grpSpPr>
+        <a:xfrm>
+          <a:off x="0" y="0"/>
+          <a:ext cx="0" cy="0"/>
+          <a:chOff x="0" y="0"/>
+          <a:chExt cx="0" cy="0"/>
+        </a:xfrm>
+      </p:grpSpPr>
       <p:sp>
         <p:nvSpPr>
           <p:cNvPr id="2" name="Slide Image Placeholder 1"/>
-          <p:cNvSpPr/>
+          <p:cNvSpPr>
+            <a:spLocks noGrp="1" noRot="1" noChangeAspect="1"/>
+          </p:cNvSpPr>
           <p:nvPr>
             <p:ph type="sldImg" idx="2"/>
           </p:nvPr>
@@ -480,7 +491,9 @@
       <p:sp>
         <p:nvSpPr>
           <p:cNvPr id="3" name="Text Placeholder 2"/>
-          <p:cNvSpPr/>
+          <p:cNvSpPr>
+            <a:spLocks noGrp="1"/>
+          </p:cNvSpPr>
           <p:nvPr>
             <p:ph type="body" idx="3"/>
           </p:nvPr>
@@ -488,6 +501,7 @@
         <p:spPr/>
         <p:txBody>
           <a:bodyPr/>
+          <a:lstStyle/>
           <a:p>
             <a:endParaRPr lang="en-US"/>
           </a:p>
@@ -546,7 +560,6 @@
               <a:rPr lang="en-US"/>
               <a:t>Click to edit Master title style</a:t>
             </a:r>
-            <a:endParaRPr lang="en-US"/>
           </a:p>
         </p:txBody>
       </p:sp>
@@ -611,7 +624,6 @@
               <a:rPr lang="en-US"/>
               <a:t>Click to edit Master subtitle style</a:t>
             </a:r>
-            <a:endParaRPr lang="en-US"/>
           </a:p>
         </p:txBody>
       </p:sp>
@@ -632,6 +644,7 @@
           <a:p>
             <a:fld id="{E0A1C52B-54FD-41A2-AC7B-BB76FA97A4EB}" type="datetimeFigureOut">
               <a:rPr lang="en-US" smtClean="0"/>
+              <a:t>3/6/2020</a:t>
             </a:fld>
             <a:endParaRPr lang="en-US"/>
           </a:p>
@@ -673,6 +686,7 @@
           <a:p>
             <a:fld id="{E37BA353-92F3-493F-B8FD-7200FA3234BB}" type="slidenum">
               <a:rPr lang="en-US" smtClean="0"/>
+              <a:t>‹nº›</a:t>
             </a:fld>
             <a:endParaRPr lang="en-US"/>
           </a:p>
@@ -722,7 +736,6 @@
               <a:rPr lang="en-US"/>
               <a:t>Click to edit Master title style</a:t>
             </a:r>
-            <a:endParaRPr lang="en-US"/>
           </a:p>
         </p:txBody>
       </p:sp>
@@ -746,7 +759,6 @@
               <a:rPr lang="en-US"/>
               <a:t>Edit Master text styles</a:t>
             </a:r>
-            <a:endParaRPr lang="en-US"/>
           </a:p>
           <a:p>
             <a:pPr lvl="1"/>
@@ -754,7 +766,6 @@
               <a:rPr lang="en-US"/>
               <a:t>Second level</a:t>
             </a:r>
-            <a:endParaRPr lang="en-US"/>
           </a:p>
           <a:p>
             <a:pPr lvl="2"/>
@@ -762,7 +773,6 @@
               <a:rPr lang="en-US"/>
               <a:t>Third level</a:t>
             </a:r>
-            <a:endParaRPr lang="en-US"/>
           </a:p>
           <a:p>
             <a:pPr lvl="3"/>
@@ -770,7 +780,6 @@
               <a:rPr lang="en-US"/>
               <a:t>Fourth level</a:t>
             </a:r>
-            <a:endParaRPr lang="en-US"/>
           </a:p>
           <a:p>
             <a:pPr lvl="4"/>
@@ -778,7 +787,6 @@
               <a:rPr lang="en-US"/>
               <a:t>Fifth level</a:t>
             </a:r>
-            <a:endParaRPr lang="en-US"/>
           </a:p>
         </p:txBody>
       </p:sp>
@@ -799,6 +807,7 @@
           <a:p>
             <a:fld id="{E0A1C52B-54FD-41A2-AC7B-BB76FA97A4EB}" type="datetimeFigureOut">
               <a:rPr lang="en-US" smtClean="0"/>
+              <a:t>3/6/2020</a:t>
             </a:fld>
             <a:endParaRPr lang="en-US"/>
           </a:p>
@@ -840,6 +849,7 @@
           <a:p>
             <a:fld id="{E37BA353-92F3-493F-B8FD-7200FA3234BB}" type="slidenum">
               <a:rPr lang="en-US" smtClean="0"/>
+              <a:t>‹nº›</a:t>
             </a:fld>
             <a:endParaRPr lang="en-US"/>
           </a:p>
@@ -894,7 +904,6 @@
               <a:rPr lang="en-US"/>
               <a:t>Click to edit Master title style</a:t>
             </a:r>
-            <a:endParaRPr lang="en-US"/>
           </a:p>
         </p:txBody>
       </p:sp>
@@ -923,7 +932,6 @@
               <a:rPr lang="en-US"/>
               <a:t>Edit Master text styles</a:t>
             </a:r>
-            <a:endParaRPr lang="en-US"/>
           </a:p>
           <a:p>
             <a:pPr lvl="1"/>
@@ -931,7 +939,6 @@
               <a:rPr lang="en-US"/>
               <a:t>Second level</a:t>
             </a:r>
-            <a:endParaRPr lang="en-US"/>
           </a:p>
           <a:p>
             <a:pPr lvl="2"/>
@@ -939,7 +946,6 @@
               <a:rPr lang="en-US"/>
               <a:t>Third level</a:t>
             </a:r>
-            <a:endParaRPr lang="en-US"/>
           </a:p>
           <a:p>
             <a:pPr lvl="3"/>
@@ -947,7 +953,6 @@
               <a:rPr lang="en-US"/>
               <a:t>Fourth level</a:t>
             </a:r>
-            <a:endParaRPr lang="en-US"/>
           </a:p>
           <a:p>
             <a:pPr lvl="4"/>
@@ -955,7 +960,6 @@
               <a:rPr lang="en-US"/>
               <a:t>Fifth level</a:t>
             </a:r>
-            <a:endParaRPr lang="en-US"/>
           </a:p>
         </p:txBody>
       </p:sp>
@@ -976,6 +980,7 @@
           <a:p>
             <a:fld id="{E0A1C52B-54FD-41A2-AC7B-BB76FA97A4EB}" type="datetimeFigureOut">
               <a:rPr lang="en-US" smtClean="0"/>
+              <a:t>3/6/2020</a:t>
             </a:fld>
             <a:endParaRPr lang="en-US"/>
           </a:p>
@@ -1017,6 +1022,7 @@
           <a:p>
             <a:fld id="{E37BA353-92F3-493F-B8FD-7200FA3234BB}" type="slidenum">
               <a:rPr lang="en-US" smtClean="0"/>
+              <a:t>‹nº›</a:t>
             </a:fld>
             <a:endParaRPr lang="en-US"/>
           </a:p>
@@ -1066,7 +1072,6 @@
               <a:rPr lang="en-US"/>
               <a:t>Click to edit Master title style</a:t>
             </a:r>
-            <a:endParaRPr lang="en-US"/>
           </a:p>
         </p:txBody>
       </p:sp>
@@ -1090,7 +1095,6 @@
               <a:rPr lang="en-US"/>
               <a:t>Edit Master text styles</a:t>
             </a:r>
-            <a:endParaRPr lang="en-US"/>
           </a:p>
           <a:p>
             <a:pPr lvl="1"/>
@@ -1098,7 +1102,6 @@
               <a:rPr lang="en-US"/>
               <a:t>Second level</a:t>
             </a:r>
-            <a:endParaRPr lang="en-US"/>
           </a:p>
           <a:p>
             <a:pPr lvl="2"/>
@@ -1106,7 +1109,6 @@
               <a:rPr lang="en-US"/>
               <a:t>Third level</a:t>
             </a:r>
-            <a:endParaRPr lang="en-US"/>
           </a:p>
           <a:p>
             <a:pPr lvl="3"/>
@@ -1114,7 +1116,6 @@
               <a:rPr lang="en-US"/>
               <a:t>Fourth level</a:t>
             </a:r>
-            <a:endParaRPr lang="en-US"/>
           </a:p>
           <a:p>
             <a:pPr lvl="4"/>
@@ -1122,7 +1123,6 @@
               <a:rPr lang="en-US"/>
               <a:t>Fifth level</a:t>
             </a:r>
-            <a:endParaRPr lang="en-US"/>
           </a:p>
         </p:txBody>
       </p:sp>
@@ -1143,6 +1143,7 @@
           <a:p>
             <a:fld id="{E0A1C52B-54FD-41A2-AC7B-BB76FA97A4EB}" type="datetimeFigureOut">
               <a:rPr lang="en-US" smtClean="0"/>
+              <a:t>3/6/2020</a:t>
             </a:fld>
             <a:endParaRPr lang="en-US"/>
           </a:p>
@@ -1184,6 +1185,7 @@
           <a:p>
             <a:fld id="{E37BA353-92F3-493F-B8FD-7200FA3234BB}" type="slidenum">
               <a:rPr lang="en-US" smtClean="0"/>
+              <a:t>‹nº›</a:t>
             </a:fld>
             <a:endParaRPr lang="en-US"/>
           </a:p>
@@ -1242,7 +1244,6 @@
               <a:rPr lang="en-US"/>
               <a:t>Click to edit Master title style</a:t>
             </a:r>
-            <a:endParaRPr lang="en-US"/>
           </a:p>
         </p:txBody>
       </p:sp>
@@ -1362,7 +1363,6 @@
               <a:rPr lang="en-US"/>
               <a:t>Edit Master text styles</a:t>
             </a:r>
-            <a:endParaRPr lang="en-US"/>
           </a:p>
         </p:txBody>
       </p:sp>
@@ -1383,6 +1383,7 @@
           <a:p>
             <a:fld id="{E0A1C52B-54FD-41A2-AC7B-BB76FA97A4EB}" type="datetimeFigureOut">
               <a:rPr lang="en-US" smtClean="0"/>
+              <a:t>3/6/2020</a:t>
             </a:fld>
             <a:endParaRPr lang="en-US"/>
           </a:p>
@@ -1424,6 +1425,7 @@
           <a:p>
             <a:fld id="{E37BA353-92F3-493F-B8FD-7200FA3234BB}" type="slidenum">
               <a:rPr lang="en-US" smtClean="0"/>
+              <a:t>‹nº›</a:t>
             </a:fld>
             <a:endParaRPr lang="en-US"/>
           </a:p>
@@ -1473,7 +1475,6 @@
               <a:rPr lang="en-US"/>
               <a:t>Click to edit Master title style</a:t>
             </a:r>
-            <a:endParaRPr lang="en-US"/>
           </a:p>
         </p:txBody>
       </p:sp>
@@ -1502,7 +1503,6 @@
               <a:rPr lang="en-US"/>
               <a:t>Edit Master text styles</a:t>
             </a:r>
-            <a:endParaRPr lang="en-US"/>
           </a:p>
           <a:p>
             <a:pPr lvl="1"/>
@@ -1510,7 +1510,6 @@
               <a:rPr lang="en-US"/>
               <a:t>Second level</a:t>
             </a:r>
-            <a:endParaRPr lang="en-US"/>
           </a:p>
           <a:p>
             <a:pPr lvl="2"/>
@@ -1518,7 +1517,6 @@
               <a:rPr lang="en-US"/>
               <a:t>Third level</a:t>
             </a:r>
-            <a:endParaRPr lang="en-US"/>
           </a:p>
           <a:p>
             <a:pPr lvl="3"/>
@@ -1526,7 +1524,6 @@
               <a:rPr lang="en-US"/>
               <a:t>Fourth level</a:t>
             </a:r>
-            <a:endParaRPr lang="en-US"/>
           </a:p>
           <a:p>
             <a:pPr lvl="4"/>
@@ -1534,7 +1531,6 @@
               <a:rPr lang="en-US"/>
               <a:t>Fifth level</a:t>
             </a:r>
-            <a:endParaRPr lang="en-US"/>
           </a:p>
         </p:txBody>
       </p:sp>
@@ -1563,7 +1559,6 @@
               <a:rPr lang="en-US"/>
               <a:t>Edit Master text styles</a:t>
             </a:r>
-            <a:endParaRPr lang="en-US"/>
           </a:p>
           <a:p>
             <a:pPr lvl="1"/>
@@ -1571,7 +1566,6 @@
               <a:rPr lang="en-US"/>
               <a:t>Second level</a:t>
             </a:r>
-            <a:endParaRPr lang="en-US"/>
           </a:p>
           <a:p>
             <a:pPr lvl="2"/>
@@ -1579,7 +1573,6 @@
               <a:rPr lang="en-US"/>
               <a:t>Third level</a:t>
             </a:r>
-            <a:endParaRPr lang="en-US"/>
           </a:p>
           <a:p>
             <a:pPr lvl="3"/>
@@ -1587,7 +1580,6 @@
               <a:rPr lang="en-US"/>
               <a:t>Fourth level</a:t>
             </a:r>
-            <a:endParaRPr lang="en-US"/>
           </a:p>
           <a:p>
             <a:pPr lvl="4"/>
@@ -1595,7 +1587,6 @@
               <a:rPr lang="en-US"/>
               <a:t>Fifth level</a:t>
             </a:r>
-            <a:endParaRPr lang="en-US"/>
           </a:p>
         </p:txBody>
       </p:sp>
@@ -1616,6 +1607,7 @@
           <a:p>
             <a:fld id="{E0A1C52B-54FD-41A2-AC7B-BB76FA97A4EB}" type="datetimeFigureOut">
               <a:rPr lang="en-US" smtClean="0"/>
+              <a:t>3/6/2020</a:t>
             </a:fld>
             <a:endParaRPr lang="en-US"/>
           </a:p>
@@ -1657,6 +1649,7 @@
           <a:p>
             <a:fld id="{E37BA353-92F3-493F-B8FD-7200FA3234BB}" type="slidenum">
               <a:rPr lang="en-US" smtClean="0"/>
+              <a:t>‹nº›</a:t>
             </a:fld>
             <a:endParaRPr lang="en-US"/>
           </a:p>
@@ -1711,7 +1704,6 @@
               <a:rPr lang="en-US"/>
               <a:t>Click to edit Master title style</a:t>
             </a:r>
-            <a:endParaRPr lang="en-US"/>
           </a:p>
         </p:txBody>
       </p:sp>
@@ -1777,7 +1769,6 @@
               <a:rPr lang="en-US"/>
               <a:t>Edit Master text styles</a:t>
             </a:r>
-            <a:endParaRPr lang="en-US"/>
           </a:p>
         </p:txBody>
       </p:sp>
@@ -1806,7 +1797,6 @@
               <a:rPr lang="en-US"/>
               <a:t>Edit Master text styles</a:t>
             </a:r>
-            <a:endParaRPr lang="en-US"/>
           </a:p>
           <a:p>
             <a:pPr lvl="1"/>
@@ -1814,7 +1804,6 @@
               <a:rPr lang="en-US"/>
               <a:t>Second level</a:t>
             </a:r>
-            <a:endParaRPr lang="en-US"/>
           </a:p>
           <a:p>
             <a:pPr lvl="2"/>
@@ -1822,7 +1811,6 @@
               <a:rPr lang="en-US"/>
               <a:t>Third level</a:t>
             </a:r>
-            <a:endParaRPr lang="en-US"/>
           </a:p>
           <a:p>
             <a:pPr lvl="3"/>
@@ -1830,7 +1818,6 @@
               <a:rPr lang="en-US"/>
               <a:t>Fourth level</a:t>
             </a:r>
-            <a:endParaRPr lang="en-US"/>
           </a:p>
           <a:p>
             <a:pPr lvl="4"/>
@@ -1838,7 +1825,6 @@
               <a:rPr lang="en-US"/>
               <a:t>Fifth level</a:t>
             </a:r>
-            <a:endParaRPr lang="en-US"/>
           </a:p>
         </p:txBody>
       </p:sp>
@@ -1904,7 +1890,6 @@
               <a:rPr lang="en-US"/>
               <a:t>Edit Master text styles</a:t>
             </a:r>
-            <a:endParaRPr lang="en-US"/>
           </a:p>
         </p:txBody>
       </p:sp>
@@ -1933,7 +1918,6 @@
               <a:rPr lang="en-US"/>
               <a:t>Edit Master text styles</a:t>
             </a:r>
-            <a:endParaRPr lang="en-US"/>
           </a:p>
           <a:p>
             <a:pPr lvl="1"/>
@@ -1941,7 +1925,6 @@
               <a:rPr lang="en-US"/>
               <a:t>Second level</a:t>
             </a:r>
-            <a:endParaRPr lang="en-US"/>
           </a:p>
           <a:p>
             <a:pPr lvl="2"/>
@@ -1949,7 +1932,6 @@
               <a:rPr lang="en-US"/>
               <a:t>Third level</a:t>
             </a:r>
-            <a:endParaRPr lang="en-US"/>
           </a:p>
           <a:p>
             <a:pPr lvl="3"/>
@@ -1957,7 +1939,6 @@
               <a:rPr lang="en-US"/>
               <a:t>Fourth level</a:t>
             </a:r>
-            <a:endParaRPr lang="en-US"/>
           </a:p>
           <a:p>
             <a:pPr lvl="4"/>
@@ -1965,7 +1946,6 @@
               <a:rPr lang="en-US"/>
               <a:t>Fifth level</a:t>
             </a:r>
-            <a:endParaRPr lang="en-US"/>
           </a:p>
         </p:txBody>
       </p:sp>
@@ -1986,6 +1966,7 @@
           <a:p>
             <a:fld id="{E0A1C52B-54FD-41A2-AC7B-BB76FA97A4EB}" type="datetimeFigureOut">
               <a:rPr lang="en-US" smtClean="0"/>
+              <a:t>3/6/2020</a:t>
             </a:fld>
             <a:endParaRPr lang="en-US"/>
           </a:p>
@@ -2027,6 +2008,7 @@
           <a:p>
             <a:fld id="{E37BA353-92F3-493F-B8FD-7200FA3234BB}" type="slidenum">
               <a:rPr lang="en-US" smtClean="0"/>
+              <a:t>‹nº›</a:t>
             </a:fld>
             <a:endParaRPr lang="en-US"/>
           </a:p>
@@ -2076,7 +2058,6 @@
               <a:rPr lang="en-US"/>
               <a:t>Click to edit Master title style</a:t>
             </a:r>
-            <a:endParaRPr lang="en-US"/>
           </a:p>
         </p:txBody>
       </p:sp>
@@ -2097,6 +2078,7 @@
           <a:p>
             <a:fld id="{E0A1C52B-54FD-41A2-AC7B-BB76FA97A4EB}" type="datetimeFigureOut">
               <a:rPr lang="en-US" smtClean="0"/>
+              <a:t>3/6/2020</a:t>
             </a:fld>
             <a:endParaRPr lang="en-US"/>
           </a:p>
@@ -2138,6 +2120,7 @@
           <a:p>
             <a:fld id="{E37BA353-92F3-493F-B8FD-7200FA3234BB}" type="slidenum">
               <a:rPr lang="en-US" smtClean="0"/>
+              <a:t>‹nº›</a:t>
             </a:fld>
             <a:endParaRPr lang="en-US"/>
           </a:p>
@@ -2185,6 +2168,7 @@
           <a:p>
             <a:fld id="{E0A1C52B-54FD-41A2-AC7B-BB76FA97A4EB}" type="datetimeFigureOut">
               <a:rPr lang="en-US" smtClean="0"/>
+              <a:t>3/6/2020</a:t>
             </a:fld>
             <a:endParaRPr lang="en-US"/>
           </a:p>
@@ -2226,6 +2210,7 @@
           <a:p>
             <a:fld id="{E37BA353-92F3-493F-B8FD-7200FA3234BB}" type="slidenum">
               <a:rPr lang="en-US" smtClean="0"/>
+              <a:t>‹nº›</a:t>
             </a:fld>
             <a:endParaRPr lang="en-US"/>
           </a:p>
@@ -2284,7 +2269,6 @@
               <a:rPr lang="en-US"/>
               <a:t>Click to edit Master title style</a:t>
             </a:r>
-            <a:endParaRPr lang="en-US"/>
           </a:p>
         </p:txBody>
       </p:sp>
@@ -2341,7 +2325,6 @@
               <a:rPr lang="en-US"/>
               <a:t>Edit Master text styles</a:t>
             </a:r>
-            <a:endParaRPr lang="en-US"/>
           </a:p>
           <a:p>
             <a:pPr lvl="1"/>
@@ -2349,7 +2332,6 @@
               <a:rPr lang="en-US"/>
               <a:t>Second level</a:t>
             </a:r>
-            <a:endParaRPr lang="en-US"/>
           </a:p>
           <a:p>
             <a:pPr lvl="2"/>
@@ -2357,7 +2339,6 @@
               <a:rPr lang="en-US"/>
               <a:t>Third level</a:t>
             </a:r>
-            <a:endParaRPr lang="en-US"/>
           </a:p>
           <a:p>
             <a:pPr lvl="3"/>
@@ -2365,7 +2346,6 @@
               <a:rPr lang="en-US"/>
               <a:t>Fourth level</a:t>
             </a:r>
-            <a:endParaRPr lang="en-US"/>
           </a:p>
           <a:p>
             <a:pPr lvl="4"/>
@@ -2373,7 +2353,6 @@
               <a:rPr lang="en-US"/>
               <a:t>Fifth level</a:t>
             </a:r>
-            <a:endParaRPr lang="en-US"/>
           </a:p>
         </p:txBody>
       </p:sp>
@@ -2439,7 +2418,6 @@
               <a:rPr lang="en-US"/>
               <a:t>Edit Master text styles</a:t>
             </a:r>
-            <a:endParaRPr lang="en-US"/>
           </a:p>
         </p:txBody>
       </p:sp>
@@ -2460,6 +2438,7 @@
           <a:p>
             <a:fld id="{E0A1C52B-54FD-41A2-AC7B-BB76FA97A4EB}" type="datetimeFigureOut">
               <a:rPr lang="en-US" smtClean="0"/>
+              <a:t>3/6/2020</a:t>
             </a:fld>
             <a:endParaRPr lang="en-US"/>
           </a:p>
@@ -2501,6 +2480,7 @@
           <a:p>
             <a:fld id="{E37BA353-92F3-493F-B8FD-7200FA3234BB}" type="slidenum">
               <a:rPr lang="en-US" smtClean="0"/>
+              <a:t>‹nº›</a:t>
             </a:fld>
             <a:endParaRPr lang="en-US"/>
           </a:p>
@@ -2559,7 +2539,6 @@
               <a:rPr lang="en-US"/>
               <a:t>Click to edit Master title style</a:t>
             </a:r>
-            <a:endParaRPr lang="en-US"/>
           </a:p>
         </p:txBody>
       </p:sp>
@@ -2686,7 +2665,6 @@
               <a:rPr lang="en-US"/>
               <a:t>Edit Master text styles</a:t>
             </a:r>
-            <a:endParaRPr lang="en-US"/>
           </a:p>
         </p:txBody>
       </p:sp>
@@ -2707,6 +2685,7 @@
           <a:p>
             <a:fld id="{E0A1C52B-54FD-41A2-AC7B-BB76FA97A4EB}" type="datetimeFigureOut">
               <a:rPr lang="en-US" smtClean="0"/>
+              <a:t>3/6/2020</a:t>
             </a:fld>
             <a:endParaRPr lang="en-US"/>
           </a:p>
@@ -2748,6 +2727,7 @@
           <a:p>
             <a:fld id="{E37BA353-92F3-493F-B8FD-7200FA3234BB}" type="slidenum">
               <a:rPr lang="en-US" smtClean="0"/>
+              <a:t>‹nº›</a:t>
             </a:fld>
             <a:endParaRPr lang="en-US"/>
           </a:p>
@@ -2812,7 +2792,6 @@
               <a:rPr lang="en-US"/>
               <a:t>Click to edit Master title style</a:t>
             </a:r>
-            <a:endParaRPr lang="en-US"/>
           </a:p>
         </p:txBody>
       </p:sp>
@@ -2846,7 +2825,6 @@
               <a:rPr lang="en-US"/>
               <a:t>Edit Master text styles</a:t>
             </a:r>
-            <a:endParaRPr lang="en-US"/>
           </a:p>
           <a:p>
             <a:pPr lvl="1"/>
@@ -2854,7 +2832,6 @@
               <a:rPr lang="en-US"/>
               <a:t>Second level</a:t>
             </a:r>
-            <a:endParaRPr lang="en-US"/>
           </a:p>
           <a:p>
             <a:pPr lvl="2"/>
@@ -2862,7 +2839,6 @@
               <a:rPr lang="en-US"/>
               <a:t>Third level</a:t>
             </a:r>
-            <a:endParaRPr lang="en-US"/>
           </a:p>
           <a:p>
             <a:pPr lvl="3"/>
@@ -2870,7 +2846,6 @@
               <a:rPr lang="en-US"/>
               <a:t>Fourth level</a:t>
             </a:r>
-            <a:endParaRPr lang="en-US"/>
           </a:p>
           <a:p>
             <a:pPr lvl="4"/>
@@ -2878,7 +2853,6 @@
               <a:rPr lang="en-US"/>
               <a:t>Fifth level</a:t>
             </a:r>
-            <a:endParaRPr lang="en-US"/>
           </a:p>
         </p:txBody>
       </p:sp>
@@ -2917,6 +2891,7 @@
           <a:p>
             <a:fld id="{E0A1C52B-54FD-41A2-AC7B-BB76FA97A4EB}" type="datetimeFigureOut">
               <a:rPr lang="en-US" smtClean="0"/>
+              <a:t>3/6/2020</a:t>
             </a:fld>
             <a:endParaRPr lang="en-US"/>
           </a:p>
@@ -2994,6 +2969,7 @@
           <a:p>
             <a:fld id="{E37BA353-92F3-493F-B8FD-7200FA3234BB}" type="slidenum">
               <a:rPr lang="en-US" smtClean="0"/>
+              <a:t>‹nº›</a:t>
             </a:fld>
             <a:endParaRPr lang="en-US"/>
           </a:p>
@@ -3315,66 +3291,6 @@
           <a:chExt cx="0" cy="0"/>
         </a:xfrm>
       </p:grpSpPr>
-      <p:pic>
-        <p:nvPicPr>
-          <p:cNvPr id="54" name="Picture 53" descr="A close up of a logo&#10;&#10;Description generated with very high confidence"/>
-          <p:cNvPicPr>
-            <a:picLocks noChangeAspect="1"/>
-          </p:cNvPicPr>
-          <p:nvPr/>
-        </p:nvPicPr>
-        <p:blipFill>
-          <a:blip r:embed="rId1">
-            <a:extLst>
-              <a:ext uri="{28A0092B-C50C-407E-A947-70E740481C1C}">
-                <a14:useLocalDpi xmlns:a14="http://schemas.microsoft.com/office/drawing/2010/main" val="0"/>
-              </a:ext>
-            </a:extLst>
-          </a:blip>
-          <a:stretch>
-            <a:fillRect/>
-          </a:stretch>
-        </p:blipFill>
-        <p:spPr>
-          <a:xfrm>
-            <a:off x="7366373" y="4835974"/>
-            <a:ext cx="1961848" cy="1961848"/>
-          </a:xfrm>
-          <a:prstGeom prst="rect">
-            <a:avLst/>
-          </a:prstGeom>
-        </p:spPr>
-      </p:pic>
-      <p:pic>
-        <p:nvPicPr>
-          <p:cNvPr id="51" name="Picture 50" descr="A close up of a logo&#10;&#10;Description generated with very high confidence"/>
-          <p:cNvPicPr>
-            <a:picLocks noChangeAspect="1"/>
-          </p:cNvPicPr>
-          <p:nvPr/>
-        </p:nvPicPr>
-        <p:blipFill>
-          <a:blip r:embed="rId1">
-            <a:extLst>
-              <a:ext uri="{28A0092B-C50C-407E-A947-70E740481C1C}">
-                <a14:useLocalDpi xmlns:a14="http://schemas.microsoft.com/office/drawing/2010/main" val="0"/>
-              </a:ext>
-            </a:extLst>
-          </a:blip>
-          <a:stretch>
-            <a:fillRect/>
-          </a:stretch>
-        </p:blipFill>
-        <p:spPr>
-          <a:xfrm>
-            <a:off x="1237814" y="4906796"/>
-            <a:ext cx="1961848" cy="1961848"/>
-          </a:xfrm>
-          <a:prstGeom prst="rect">
-            <a:avLst/>
-          </a:prstGeom>
-        </p:spPr>
-      </p:pic>
       <p:cxnSp>
         <p:nvCxnSpPr>
           <p:cNvPr id="7" name="Straight Connector 6"/>
@@ -3666,276 +3582,6 @@
           </a:p>
         </p:txBody>
       </p:sp>
-      <p:pic>
-        <p:nvPicPr>
-          <p:cNvPr id="34" name="Picture 33" descr="A close up of a logo&#10;&#10;Description generated with very high confidence"/>
-          <p:cNvPicPr>
-            <a:picLocks noChangeAspect="1"/>
-          </p:cNvPicPr>
-          <p:nvPr/>
-        </p:nvPicPr>
-        <p:blipFill>
-          <a:blip r:embed="rId1">
-            <a:extLst>
-              <a:ext uri="{28A0092B-C50C-407E-A947-70E740481C1C}">
-                <a14:useLocalDpi xmlns:a14="http://schemas.microsoft.com/office/drawing/2010/main" val="0"/>
-              </a:ext>
-            </a:extLst>
-          </a:blip>
-          <a:stretch>
-            <a:fillRect/>
-          </a:stretch>
-        </p:blipFill>
-        <p:spPr>
-          <a:xfrm>
-            <a:off x="2462681" y="-324243"/>
-            <a:ext cx="1961848" cy="1961848"/>
-          </a:xfrm>
-          <a:prstGeom prst="rect">
-            <a:avLst/>
-          </a:prstGeom>
-        </p:spPr>
-      </p:pic>
-      <p:pic>
-        <p:nvPicPr>
-          <p:cNvPr id="35" name="Picture 34" descr="A close up of a logo&#10;&#10;Description generated with very high confidence"/>
-          <p:cNvPicPr>
-            <a:picLocks noChangeAspect="1"/>
-          </p:cNvPicPr>
-          <p:nvPr/>
-        </p:nvPicPr>
-        <p:blipFill>
-          <a:blip r:embed="rId1">
-            <a:extLst>
-              <a:ext uri="{28A0092B-C50C-407E-A947-70E740481C1C}">
-                <a14:useLocalDpi xmlns:a14="http://schemas.microsoft.com/office/drawing/2010/main" val="0"/>
-              </a:ext>
-            </a:extLst>
-          </a:blip>
-          <a:stretch>
-            <a:fillRect/>
-          </a:stretch>
-        </p:blipFill>
-        <p:spPr>
-          <a:xfrm>
-            <a:off x="4003826" y="168998"/>
-            <a:ext cx="1961848" cy="1961848"/>
-          </a:xfrm>
-          <a:prstGeom prst="rect">
-            <a:avLst/>
-          </a:prstGeom>
-        </p:spPr>
-      </p:pic>
-      <p:pic>
-        <p:nvPicPr>
-          <p:cNvPr id="36" name="Picture 35" descr="A close up of a logo&#10;&#10;Description generated with very high confidence"/>
-          <p:cNvPicPr>
-            <a:picLocks noChangeAspect="1"/>
-          </p:cNvPicPr>
-          <p:nvPr/>
-        </p:nvPicPr>
-        <p:blipFill>
-          <a:blip r:embed="rId1">
-            <a:extLst>
-              <a:ext uri="{28A0092B-C50C-407E-A947-70E740481C1C}">
-                <a14:useLocalDpi xmlns:a14="http://schemas.microsoft.com/office/drawing/2010/main" val="0"/>
-              </a:ext>
-            </a:extLst>
-          </a:blip>
-          <a:stretch>
-            <a:fillRect/>
-          </a:stretch>
-        </p:blipFill>
-        <p:spPr>
-          <a:xfrm>
-            <a:off x="6097420" y="168668"/>
-            <a:ext cx="1961848" cy="1961848"/>
-          </a:xfrm>
-          <a:prstGeom prst="rect">
-            <a:avLst/>
-          </a:prstGeom>
-        </p:spPr>
-      </p:pic>
-      <p:pic>
-        <p:nvPicPr>
-          <p:cNvPr id="37" name="Picture 36" descr="A close up of a logo&#10;&#10;Description generated with very high confidence"/>
-          <p:cNvPicPr>
-            <a:picLocks noChangeAspect="1"/>
-          </p:cNvPicPr>
-          <p:nvPr/>
-        </p:nvPicPr>
-        <p:blipFill>
-          <a:blip r:embed="rId1">
-            <a:extLst>
-              <a:ext uri="{28A0092B-C50C-407E-A947-70E740481C1C}">
-                <a14:useLocalDpi xmlns:a14="http://schemas.microsoft.com/office/drawing/2010/main" val="0"/>
-              </a:ext>
-            </a:extLst>
-          </a:blip>
-          <a:stretch>
-            <a:fillRect/>
-          </a:stretch>
-        </p:blipFill>
-        <p:spPr>
-          <a:xfrm>
-            <a:off x="102446" y="415592"/>
-            <a:ext cx="1961848" cy="1961848"/>
-          </a:xfrm>
-          <a:prstGeom prst="rect">
-            <a:avLst/>
-          </a:prstGeom>
-        </p:spPr>
-      </p:pic>
-      <p:pic>
-        <p:nvPicPr>
-          <p:cNvPr id="38" name="Picture 37" descr="A close up of a logo&#10;&#10;Description generated with very high confidence"/>
-          <p:cNvPicPr>
-            <a:picLocks noChangeAspect="1"/>
-          </p:cNvPicPr>
-          <p:nvPr/>
-        </p:nvPicPr>
-        <p:blipFill>
-          <a:blip r:embed="rId1">
-            <a:extLst>
-              <a:ext uri="{28A0092B-C50C-407E-A947-70E740481C1C}">
-                <a14:useLocalDpi xmlns:a14="http://schemas.microsoft.com/office/drawing/2010/main" val="0"/>
-              </a:ext>
-            </a:extLst>
-          </a:blip>
-          <a:stretch>
-            <a:fillRect/>
-          </a:stretch>
-        </p:blipFill>
-        <p:spPr>
-          <a:xfrm>
-            <a:off x="113846" y="1910817"/>
-            <a:ext cx="1961848" cy="1961848"/>
-          </a:xfrm>
-          <a:prstGeom prst="rect">
-            <a:avLst/>
-          </a:prstGeom>
-        </p:spPr>
-      </p:pic>
-      <p:pic>
-        <p:nvPicPr>
-          <p:cNvPr id="39" name="Picture 38" descr="A close up of a logo&#10;&#10;Description generated with very high confidence"/>
-          <p:cNvPicPr>
-            <a:picLocks noChangeAspect="1"/>
-          </p:cNvPicPr>
-          <p:nvPr/>
-        </p:nvPicPr>
-        <p:blipFill>
-          <a:blip r:embed="rId1">
-            <a:extLst>
-              <a:ext uri="{28A0092B-C50C-407E-A947-70E740481C1C}">
-                <a14:useLocalDpi xmlns:a14="http://schemas.microsoft.com/office/drawing/2010/main" val="0"/>
-              </a:ext>
-            </a:extLst>
-          </a:blip>
-          <a:stretch>
-            <a:fillRect/>
-          </a:stretch>
-        </p:blipFill>
-        <p:spPr>
-          <a:xfrm>
-            <a:off x="2894018" y="1437117"/>
-            <a:ext cx="1961848" cy="1961848"/>
-          </a:xfrm>
-          <a:prstGeom prst="rect">
-            <a:avLst/>
-          </a:prstGeom>
-        </p:spPr>
-      </p:pic>
-      <p:pic>
-        <p:nvPicPr>
-          <p:cNvPr id="43" name="Picture 42" descr="A close up of a logo&#10;&#10;Description generated with very high confidence"/>
-          <p:cNvPicPr>
-            <a:picLocks noChangeAspect="1"/>
-          </p:cNvPicPr>
-          <p:nvPr/>
-        </p:nvPicPr>
-        <p:blipFill>
-          <a:blip r:embed="rId1">
-            <a:extLst>
-              <a:ext uri="{28A0092B-C50C-407E-A947-70E740481C1C}">
-                <a14:useLocalDpi xmlns:a14="http://schemas.microsoft.com/office/drawing/2010/main" val="0"/>
-              </a:ext>
-            </a:extLst>
-          </a:blip>
-          <a:stretch>
-            <a:fillRect/>
-          </a:stretch>
-        </p:blipFill>
-        <p:spPr>
-          <a:xfrm>
-            <a:off x="10052835" y="618038"/>
-            <a:ext cx="1961848" cy="1961848"/>
-          </a:xfrm>
-          <a:prstGeom prst="rect">
-            <a:avLst/>
-          </a:prstGeom>
-        </p:spPr>
-      </p:pic>
-      <p:pic>
-        <p:nvPicPr>
-          <p:cNvPr id="44" name="Picture 43" descr="A close up of a logo&#10;&#10;Description generated with very high confidence"/>
-          <p:cNvPicPr>
-            <a:picLocks noChangeAspect="1"/>
-          </p:cNvPicPr>
-          <p:nvPr/>
-        </p:nvPicPr>
-        <p:blipFill>
-          <a:blip r:embed="rId1">
-            <a:extLst>
-              <a:ext uri="{28A0092B-C50C-407E-A947-70E740481C1C}">
-                <a14:useLocalDpi xmlns:a14="http://schemas.microsoft.com/office/drawing/2010/main" val="0"/>
-              </a:ext>
-            </a:extLst>
-          </a:blip>
-          <a:stretch>
-            <a:fillRect/>
-          </a:stretch>
-        </p:blipFill>
-        <p:spPr>
-          <a:xfrm>
-            <a:off x="10014154" y="2217000"/>
-            <a:ext cx="1961848" cy="1961848"/>
-          </a:xfrm>
-          <a:prstGeom prst="rect">
-            <a:avLst/>
-          </a:prstGeom>
-        </p:spPr>
-      </p:pic>
-      <p:pic>
-        <p:nvPicPr>
-          <p:cNvPr id="45" name="Picture 44" descr="A close up of a logo&#10;&#10;Description generated with very high confidence"/>
-          <p:cNvPicPr>
-            <a:picLocks noChangeAspect="1"/>
-          </p:cNvPicPr>
-          <p:nvPr/>
-        </p:nvPicPr>
-        <p:blipFill>
-          <a:blip r:embed="rId1">
-            <a:extLst>
-              <a:ext uri="{28A0092B-C50C-407E-A947-70E740481C1C}">
-                <a14:useLocalDpi xmlns:a14="http://schemas.microsoft.com/office/drawing/2010/main" val="0"/>
-              </a:ext>
-            </a:extLst>
-          </a:blip>
-          <a:stretch>
-            <a:fillRect/>
-          </a:stretch>
-        </p:blipFill>
-        <p:spPr>
-          <a:xfrm>
-            <a:off x="7209155" y="1472520"/>
-            <a:ext cx="1961848" cy="1961848"/>
-          </a:xfrm>
-          <a:prstGeom prst="rect">
-            <a:avLst/>
-          </a:prstGeom>
-        </p:spPr>
-      </p:pic>
       <p:sp>
         <p:nvSpPr>
           <p:cNvPr id="46" name="TextBox 45"/>
@@ -3970,226 +3616,656 @@
           </a:p>
         </p:txBody>
       </p:sp>
-      <p:pic>
-        <p:nvPicPr>
-          <p:cNvPr id="47" name="Picture 46" descr="A close up of a logo&#10;&#10;Description generated with very high confidence"/>
-          <p:cNvPicPr>
-            <a:picLocks noChangeAspect="1"/>
-          </p:cNvPicPr>
-          <p:nvPr/>
-        </p:nvPicPr>
-        <p:blipFill>
-          <a:blip r:embed="rId1">
+      <p:grpSp>
+        <p:nvGrpSpPr>
+          <p:cNvPr id="4" name="Agrupar 3">
             <a:extLst>
-              <a:ext uri="{28A0092B-C50C-407E-A947-70E740481C1C}">
-                <a14:useLocalDpi xmlns:a14="http://schemas.microsoft.com/office/drawing/2010/main" val="0"/>
+              <a:ext uri="{FF2B5EF4-FFF2-40B4-BE49-F238E27FC236}">
+                <a16:creationId xmlns:a16="http://schemas.microsoft.com/office/drawing/2014/main" id="{D3B96825-2077-4839-8296-7547348C418F}"/>
               </a:ext>
             </a:extLst>
-          </a:blip>
-          <a:stretch>
-            <a:fillRect/>
-          </a:stretch>
-        </p:blipFill>
-        <p:spPr>
-          <a:xfrm>
-            <a:off x="5947862" y="2889538"/>
-            <a:ext cx="1961848" cy="1961848"/>
-          </a:xfrm>
-          <a:prstGeom prst="rect">
-            <a:avLst/>
-          </a:prstGeom>
-        </p:spPr>
-      </p:pic>
-      <p:pic>
-        <p:nvPicPr>
-          <p:cNvPr id="48" name="Picture 47" descr="A close up of a logo&#10;&#10;Description generated with very high confidence"/>
-          <p:cNvPicPr>
-            <a:picLocks noChangeAspect="1"/>
-          </p:cNvPicPr>
+          </p:cNvPr>
+          <p:cNvGrpSpPr/>
           <p:nvPr/>
-        </p:nvPicPr>
-        <p:blipFill>
-          <a:blip r:embed="rId1">
+        </p:nvGrpSpPr>
+        <p:grpSpPr>
+          <a:xfrm>
+            <a:off x="2717833" y="-211252"/>
+            <a:ext cx="1659045" cy="1659045"/>
+            <a:chOff x="2595284" y="-313597"/>
+            <a:chExt cx="1659045" cy="1659045"/>
+          </a:xfrm>
+        </p:grpSpPr>
+        <p:pic>
+          <p:nvPicPr>
+            <p:cNvPr id="34" name="Picture 33" descr="A close up of a logo&#10;&#10;Description generated with very high confidence"/>
+            <p:cNvPicPr>
+              <a:picLocks noChangeAspect="1"/>
+            </p:cNvPicPr>
+            <p:nvPr/>
+          </p:nvPicPr>
+          <p:blipFill>
+            <a:blip r:embed="rId3">
+              <a:extLst>
+                <a:ext uri="{28A0092B-C50C-407E-A947-70E740481C1C}">
+                  <a14:useLocalDpi xmlns:a14="http://schemas.microsoft.com/office/drawing/2010/main" val="0"/>
+                </a:ext>
+              </a:extLst>
+            </a:blip>
+            <a:stretch>
+              <a:fillRect/>
+            </a:stretch>
+          </p:blipFill>
+          <p:spPr>
+            <a:xfrm>
+              <a:off x="2595284" y="-313597"/>
+              <a:ext cx="1659045" cy="1659045"/>
+            </a:xfrm>
+            <a:prstGeom prst="rect">
+              <a:avLst/>
+            </a:prstGeom>
+          </p:spPr>
+        </p:pic>
+        <p:sp>
+          <p:nvSpPr>
+            <p:cNvPr id="56" name="TextBox 55"/>
+            <p:cNvSpPr txBox="1"/>
+            <p:nvPr/>
+          </p:nvSpPr>
+          <p:spPr>
+            <a:xfrm>
+              <a:off x="2981504" y="62168"/>
+              <a:ext cx="896999" cy="938719"/>
+            </a:xfrm>
+            <a:prstGeom prst="rect">
+              <a:avLst/>
+            </a:prstGeom>
+            <a:noFill/>
+          </p:spPr>
+          <p:txBody>
+            <a:bodyPr wrap="square" rtlCol="0">
+              <a:spAutoFit/>
+            </a:bodyPr>
+            <a:lstStyle/>
+            <a:p>
+              <a:r>
+                <a:rPr lang="pt-PT" altLang="pt-BR" sz="1100" dirty="0"/>
+                <a:t>”Treinando mais eu alcanço meus objetivos”</a:t>
+              </a:r>
+            </a:p>
+          </p:txBody>
+        </p:sp>
+      </p:grpSp>
+      <p:grpSp>
+        <p:nvGrpSpPr>
+          <p:cNvPr id="5" name="Agrupar 4">
             <a:extLst>
-              <a:ext uri="{28A0092B-C50C-407E-A947-70E740481C1C}">
-                <a14:useLocalDpi xmlns:a14="http://schemas.microsoft.com/office/drawing/2010/main" val="0"/>
+              <a:ext uri="{FF2B5EF4-FFF2-40B4-BE49-F238E27FC236}">
+                <a16:creationId xmlns:a16="http://schemas.microsoft.com/office/drawing/2014/main" id="{52E3782D-0EC1-4405-AFEC-AE658776D1D0}"/>
               </a:ext>
             </a:extLst>
-          </a:blip>
-          <a:stretch>
-            <a:fillRect/>
-          </a:stretch>
-        </p:blipFill>
-        <p:spPr>
-          <a:xfrm>
-            <a:off x="4344185" y="2922005"/>
-            <a:ext cx="1961848" cy="1961848"/>
-          </a:xfrm>
-          <a:prstGeom prst="rect">
-            <a:avLst/>
-          </a:prstGeom>
-        </p:spPr>
-      </p:pic>
-      <p:pic>
-        <p:nvPicPr>
-          <p:cNvPr id="49" name="Picture 48" descr="A close up of a logo&#10;&#10;Description generated with very high confidence"/>
-          <p:cNvPicPr>
-            <a:picLocks noChangeAspect="1"/>
-          </p:cNvPicPr>
+          </p:cNvPr>
+          <p:cNvGrpSpPr/>
           <p:nvPr/>
-        </p:nvPicPr>
-        <p:blipFill>
-          <a:blip r:embed="rId1">
+        </p:nvGrpSpPr>
+        <p:grpSpPr>
+          <a:xfrm>
+            <a:off x="4135357" y="392229"/>
+            <a:ext cx="1659600" cy="1659600"/>
+            <a:chOff x="4003826" y="168998"/>
+            <a:chExt cx="1659600" cy="1659600"/>
+          </a:xfrm>
+        </p:grpSpPr>
+        <p:pic>
+          <p:nvPicPr>
+            <p:cNvPr id="35" name="Picture 34" descr="A close up of a logo&#10;&#10;Description generated with very high confidence"/>
+            <p:cNvPicPr>
+              <a:picLocks noChangeAspect="1"/>
+            </p:cNvPicPr>
+            <p:nvPr/>
+          </p:nvPicPr>
+          <p:blipFill>
+            <a:blip r:embed="rId3">
+              <a:extLst>
+                <a:ext uri="{28A0092B-C50C-407E-A947-70E740481C1C}">
+                  <a14:useLocalDpi xmlns:a14="http://schemas.microsoft.com/office/drawing/2010/main" val="0"/>
+                </a:ext>
+              </a:extLst>
+            </a:blip>
+            <a:stretch>
+              <a:fillRect/>
+            </a:stretch>
+          </p:blipFill>
+          <p:spPr>
+            <a:xfrm>
+              <a:off x="4003826" y="168998"/>
+              <a:ext cx="1659600" cy="1659600"/>
+            </a:xfrm>
+            <a:prstGeom prst="rect">
+              <a:avLst/>
+            </a:prstGeom>
+          </p:spPr>
+        </p:pic>
+        <p:sp>
+          <p:nvSpPr>
+            <p:cNvPr id="57" name="TextBox 56"/>
+            <p:cNvSpPr txBox="1"/>
+            <p:nvPr/>
+          </p:nvSpPr>
+          <p:spPr>
+            <a:xfrm>
+              <a:off x="4333778" y="463636"/>
+              <a:ext cx="1120382" cy="938719"/>
+            </a:xfrm>
+            <a:prstGeom prst="rect">
+              <a:avLst/>
+            </a:prstGeom>
+            <a:noFill/>
+          </p:spPr>
+          <p:txBody>
+            <a:bodyPr wrap="square" rtlCol="0">
+              <a:spAutoFit/>
+            </a:bodyPr>
+            <a:lstStyle/>
+            <a:p>
+              <a:r>
+                <a:rPr lang="pt-PT" altLang="en-US" sz="1100" dirty="0"/>
+                <a:t>“Me interando das novas atualizações melhoro minha gameplay”</a:t>
+              </a:r>
+            </a:p>
+          </p:txBody>
+        </p:sp>
+      </p:grpSp>
+      <p:grpSp>
+        <p:nvGrpSpPr>
+          <p:cNvPr id="6" name="Agrupar 5">
             <a:extLst>
-              <a:ext uri="{28A0092B-C50C-407E-A947-70E740481C1C}">
-                <a14:useLocalDpi xmlns:a14="http://schemas.microsoft.com/office/drawing/2010/main" val="0"/>
+              <a:ext uri="{FF2B5EF4-FFF2-40B4-BE49-F238E27FC236}">
+                <a16:creationId xmlns:a16="http://schemas.microsoft.com/office/drawing/2014/main" id="{5F67387B-528A-4BE1-A2A7-7BDF04F50FD5}"/>
               </a:ext>
             </a:extLst>
-          </a:blip>
-          <a:stretch>
-            <a:fillRect/>
-          </a:stretch>
-        </p:blipFill>
-        <p:spPr>
-          <a:xfrm>
-            <a:off x="2668797" y="3245958"/>
-            <a:ext cx="1961848" cy="1961848"/>
-          </a:xfrm>
-          <a:prstGeom prst="rect">
-            <a:avLst/>
-          </a:prstGeom>
-        </p:spPr>
-      </p:pic>
-      <p:pic>
-        <p:nvPicPr>
-          <p:cNvPr id="50" name="Picture 49" descr="A close up of a logo&#10;&#10;Description generated with very high confidence"/>
-          <p:cNvPicPr>
-            <a:picLocks noChangeAspect="1"/>
-          </p:cNvPicPr>
+          </p:cNvPr>
+          <p:cNvGrpSpPr/>
           <p:nvPr/>
-        </p:nvPicPr>
-        <p:blipFill>
-          <a:blip r:embed="rId1">
+        </p:nvGrpSpPr>
+        <p:grpSpPr>
+          <a:xfrm>
+            <a:off x="6297175" y="384038"/>
+            <a:ext cx="1659600" cy="1659600"/>
+            <a:chOff x="6097420" y="168668"/>
+            <a:chExt cx="1659600" cy="1659600"/>
+          </a:xfrm>
+        </p:grpSpPr>
+        <p:pic>
+          <p:nvPicPr>
+            <p:cNvPr id="36" name="Picture 35" descr="A close up of a logo&#10;&#10;Description generated with very high confidence"/>
+            <p:cNvPicPr>
+              <a:picLocks noChangeAspect="1"/>
+            </p:cNvPicPr>
+            <p:nvPr/>
+          </p:nvPicPr>
+          <p:blipFill>
+            <a:blip r:embed="rId3">
+              <a:extLst>
+                <a:ext uri="{28A0092B-C50C-407E-A947-70E740481C1C}">
+                  <a14:useLocalDpi xmlns:a14="http://schemas.microsoft.com/office/drawing/2010/main" val="0"/>
+                </a:ext>
+              </a:extLst>
+            </a:blip>
+            <a:stretch>
+              <a:fillRect/>
+            </a:stretch>
+          </p:blipFill>
+          <p:spPr>
+            <a:xfrm>
+              <a:off x="6097420" y="168668"/>
+              <a:ext cx="1659600" cy="1659600"/>
+            </a:xfrm>
+            <a:prstGeom prst="rect">
+              <a:avLst/>
+            </a:prstGeom>
+          </p:spPr>
+        </p:pic>
+        <p:sp>
+          <p:nvSpPr>
+            <p:cNvPr id="58" name="TextBox 57"/>
+            <p:cNvSpPr txBox="1"/>
+            <p:nvPr/>
+          </p:nvSpPr>
+          <p:spPr>
+            <a:xfrm>
+              <a:off x="6413449" y="526109"/>
+              <a:ext cx="1014006" cy="769441"/>
+            </a:xfrm>
+            <a:prstGeom prst="rect">
+              <a:avLst/>
+            </a:prstGeom>
+            <a:noFill/>
+          </p:spPr>
+          <p:txBody>
+            <a:bodyPr wrap="square" rtlCol="0">
+              <a:spAutoFit/>
+            </a:bodyPr>
+            <a:lstStyle/>
+            <a:p>
+              <a:r>
+                <a:rPr lang="pt-PT" altLang="en-US" sz="1100" dirty="0"/>
+                <a:t>“Espero que os jogos fiquem mais acessíveis”</a:t>
+              </a:r>
+            </a:p>
+          </p:txBody>
+        </p:sp>
+      </p:grpSp>
+      <p:grpSp>
+        <p:nvGrpSpPr>
+          <p:cNvPr id="71" name="Agrupar 70">
             <a:extLst>
-              <a:ext uri="{28A0092B-C50C-407E-A947-70E740481C1C}">
-                <a14:useLocalDpi xmlns:a14="http://schemas.microsoft.com/office/drawing/2010/main" val="0"/>
+              <a:ext uri="{FF2B5EF4-FFF2-40B4-BE49-F238E27FC236}">
+                <a16:creationId xmlns:a16="http://schemas.microsoft.com/office/drawing/2014/main" id="{1CAF2E64-BB1E-4709-89A4-C8726F4A90EA}"/>
               </a:ext>
             </a:extLst>
-          </a:blip>
-          <a:stretch>
-            <a:fillRect/>
-          </a:stretch>
-        </p:blipFill>
-        <p:spPr>
-          <a:xfrm>
-            <a:off x="-303433" y="4906347"/>
-            <a:ext cx="1961848" cy="1961848"/>
-          </a:xfrm>
-          <a:prstGeom prst="rect">
-            <a:avLst/>
-          </a:prstGeom>
-        </p:spPr>
-      </p:pic>
-      <p:pic>
-        <p:nvPicPr>
-          <p:cNvPr id="52" name="Picture 51" descr="A close up of a logo&#10;&#10;Description generated with very high confidence"/>
-          <p:cNvPicPr>
-            <a:picLocks noChangeAspect="1"/>
-          </p:cNvPicPr>
+          </p:cNvPr>
+          <p:cNvGrpSpPr/>
           <p:nvPr/>
-        </p:nvPicPr>
-        <p:blipFill>
-          <a:blip r:embed="rId1">
+        </p:nvGrpSpPr>
+        <p:grpSpPr>
+          <a:xfrm>
+            <a:off x="298709" y="528502"/>
+            <a:ext cx="1659600" cy="1659600"/>
+            <a:chOff x="102446" y="415592"/>
+            <a:chExt cx="1659600" cy="1659600"/>
+          </a:xfrm>
+        </p:grpSpPr>
+        <p:pic>
+          <p:nvPicPr>
+            <p:cNvPr id="37" name="Picture 36" descr="A close up of a logo&#10;&#10;Description generated with very high confidence"/>
+            <p:cNvPicPr>
+              <a:picLocks noChangeAspect="1"/>
+            </p:cNvPicPr>
+            <p:nvPr/>
+          </p:nvPicPr>
+          <p:blipFill>
+            <a:blip r:embed="rId3">
+              <a:extLst>
+                <a:ext uri="{28A0092B-C50C-407E-A947-70E740481C1C}">
+                  <a14:useLocalDpi xmlns:a14="http://schemas.microsoft.com/office/drawing/2010/main" val="0"/>
+                </a:ext>
+              </a:extLst>
+            </a:blip>
+            <a:stretch>
+              <a:fillRect/>
+            </a:stretch>
+          </p:blipFill>
+          <p:spPr>
+            <a:xfrm>
+              <a:off x="102446" y="415592"/>
+              <a:ext cx="1659600" cy="1659600"/>
+            </a:xfrm>
+            <a:prstGeom prst="rect">
+              <a:avLst/>
+            </a:prstGeom>
+          </p:spPr>
+        </p:pic>
+        <p:sp>
+          <p:nvSpPr>
+            <p:cNvPr id="59" name="TextBox 58"/>
+            <p:cNvSpPr txBox="1"/>
+            <p:nvPr/>
+          </p:nvSpPr>
+          <p:spPr>
+            <a:xfrm>
+              <a:off x="466460" y="755432"/>
+              <a:ext cx="897255" cy="600164"/>
+            </a:xfrm>
+            <a:prstGeom prst="rect">
+              <a:avLst/>
+            </a:prstGeom>
+            <a:noFill/>
+          </p:spPr>
+          <p:txBody>
+            <a:bodyPr wrap="square" rtlCol="0">
+              <a:spAutoFit/>
+            </a:bodyPr>
+            <a:lstStyle/>
+            <a:p>
+              <a:r>
+                <a:rPr lang="pt-PT" altLang="pt-BR" sz="1100" dirty="0"/>
+                <a:t>Tendências dentro dos jogos</a:t>
+              </a:r>
+            </a:p>
+          </p:txBody>
+        </p:sp>
+      </p:grpSp>
+      <p:grpSp>
+        <p:nvGrpSpPr>
+          <p:cNvPr id="75" name="Agrupar 74">
             <a:extLst>
-              <a:ext uri="{28A0092B-C50C-407E-A947-70E740481C1C}">
-                <a14:useLocalDpi xmlns:a14="http://schemas.microsoft.com/office/drawing/2010/main" val="0"/>
+              <a:ext uri="{FF2B5EF4-FFF2-40B4-BE49-F238E27FC236}">
+                <a16:creationId xmlns:a16="http://schemas.microsoft.com/office/drawing/2014/main" id="{C0CC18E9-47A1-4ADC-B7BD-57A6006E1725}"/>
               </a:ext>
             </a:extLst>
-          </a:blip>
-          <a:stretch>
-            <a:fillRect/>
-          </a:stretch>
-        </p:blipFill>
-        <p:spPr>
-          <a:xfrm>
-            <a:off x="2819297" y="4906544"/>
-            <a:ext cx="1961848" cy="1961848"/>
-          </a:xfrm>
-          <a:prstGeom prst="rect">
-            <a:avLst/>
-          </a:prstGeom>
-        </p:spPr>
-      </p:pic>
-      <p:pic>
-        <p:nvPicPr>
-          <p:cNvPr id="53" name="Picture 52" descr="A close up of a logo&#10;&#10;Description generated with very high confidence"/>
-          <p:cNvPicPr>
-            <a:picLocks noChangeAspect="1"/>
-          </p:cNvPicPr>
+          </p:cNvPr>
+          <p:cNvGrpSpPr/>
           <p:nvPr/>
-        </p:nvPicPr>
-        <p:blipFill>
-          <a:blip r:embed="rId1">
+        </p:nvGrpSpPr>
+        <p:grpSpPr>
+          <a:xfrm>
+            <a:off x="3183257" y="1653526"/>
+            <a:ext cx="1659600" cy="1659600"/>
+            <a:chOff x="2894018" y="1437117"/>
+            <a:chExt cx="1659600" cy="1659600"/>
+          </a:xfrm>
+        </p:grpSpPr>
+        <p:pic>
+          <p:nvPicPr>
+            <p:cNvPr id="39" name="Picture 38" descr="A close up of a logo&#10;&#10;Description generated with very high confidence"/>
+            <p:cNvPicPr>
+              <a:picLocks noChangeAspect="1"/>
+            </p:cNvPicPr>
+            <p:nvPr/>
+          </p:nvPicPr>
+          <p:blipFill>
+            <a:blip r:embed="rId3">
+              <a:extLst>
+                <a:ext uri="{28A0092B-C50C-407E-A947-70E740481C1C}">
+                  <a14:useLocalDpi xmlns:a14="http://schemas.microsoft.com/office/drawing/2010/main" val="0"/>
+                </a:ext>
+              </a:extLst>
+            </a:blip>
+            <a:stretch>
+              <a:fillRect/>
+            </a:stretch>
+          </p:blipFill>
+          <p:spPr>
+            <a:xfrm>
+              <a:off x="2894018" y="1437117"/>
+              <a:ext cx="1659600" cy="1659600"/>
+            </a:xfrm>
+            <a:prstGeom prst="rect">
+              <a:avLst/>
+            </a:prstGeom>
+          </p:spPr>
+        </p:pic>
+        <p:sp>
+          <p:nvSpPr>
+            <p:cNvPr id="60" name="TextBox 59"/>
+            <p:cNvSpPr txBox="1"/>
+            <p:nvPr/>
+          </p:nvSpPr>
+          <p:spPr>
+            <a:xfrm>
+              <a:off x="3190304" y="1746153"/>
+              <a:ext cx="1120382" cy="769441"/>
+            </a:xfrm>
+            <a:prstGeom prst="rect">
+              <a:avLst/>
+            </a:prstGeom>
+            <a:noFill/>
+          </p:spPr>
+          <p:txBody>
+            <a:bodyPr wrap="square" rtlCol="0">
+              <a:spAutoFit/>
+            </a:bodyPr>
+            <a:lstStyle/>
+            <a:p>
+              <a:r>
+                <a:rPr lang="pt-PT" altLang="en-US" sz="1100" dirty="0"/>
+                <a:t>Notícias sobre os lançamentos (equipamentos, atualizações)</a:t>
+              </a:r>
+            </a:p>
+          </p:txBody>
+        </p:sp>
+      </p:grpSp>
+      <p:grpSp>
+        <p:nvGrpSpPr>
+          <p:cNvPr id="42" name="Agrupar 41">
             <a:extLst>
-              <a:ext uri="{28A0092B-C50C-407E-A947-70E740481C1C}">
-                <a14:useLocalDpi xmlns:a14="http://schemas.microsoft.com/office/drawing/2010/main" val="0"/>
+              <a:ext uri="{FF2B5EF4-FFF2-40B4-BE49-F238E27FC236}">
+                <a16:creationId xmlns:a16="http://schemas.microsoft.com/office/drawing/2014/main" id="{C1E0223F-4C14-41A0-8940-FF58A4CF0252}"/>
               </a:ext>
             </a:extLst>
-          </a:blip>
-          <a:stretch>
-            <a:fillRect/>
-          </a:stretch>
-        </p:blipFill>
-        <p:spPr>
-          <a:xfrm>
-            <a:off x="5825761" y="4859655"/>
-            <a:ext cx="1961848" cy="1961848"/>
-          </a:xfrm>
-          <a:prstGeom prst="rect">
-            <a:avLst/>
-          </a:prstGeom>
-        </p:spPr>
-      </p:pic>
-      <p:pic>
-        <p:nvPicPr>
-          <p:cNvPr id="55" name="Picture 54" descr="A close up of a logo&#10;&#10;Description generated with very high confidence"/>
-          <p:cNvPicPr>
-            <a:picLocks noChangeAspect="1"/>
-          </p:cNvPicPr>
+          </p:cNvPr>
+          <p:cNvGrpSpPr/>
           <p:nvPr/>
-        </p:nvPicPr>
-        <p:blipFill>
-          <a:blip r:embed="rId1">
+        </p:nvGrpSpPr>
+        <p:grpSpPr>
+          <a:xfrm>
+            <a:off x="284756" y="2776284"/>
+            <a:ext cx="1659600" cy="1659600"/>
+            <a:chOff x="113846" y="1910817"/>
+            <a:chExt cx="1659600" cy="1659600"/>
+          </a:xfrm>
+        </p:grpSpPr>
+        <p:pic>
+          <p:nvPicPr>
+            <p:cNvPr id="38" name="Picture 37" descr="A close up of a logo&#10;&#10;Description generated with very high confidence"/>
+            <p:cNvPicPr>
+              <a:picLocks noChangeAspect="1"/>
+            </p:cNvPicPr>
+            <p:nvPr/>
+          </p:nvPicPr>
+          <p:blipFill>
+            <a:blip r:embed="rId3">
+              <a:extLst>
+                <a:ext uri="{28A0092B-C50C-407E-A947-70E740481C1C}">
+                  <a14:useLocalDpi xmlns:a14="http://schemas.microsoft.com/office/drawing/2010/main" val="0"/>
+                </a:ext>
+              </a:extLst>
+            </a:blip>
+            <a:stretch>
+              <a:fillRect/>
+            </a:stretch>
+          </p:blipFill>
+          <p:spPr>
+            <a:xfrm>
+              <a:off x="113846" y="1910817"/>
+              <a:ext cx="1659600" cy="1659600"/>
+            </a:xfrm>
+            <a:prstGeom prst="rect">
+              <a:avLst/>
+            </a:prstGeom>
+          </p:spPr>
+        </p:pic>
+        <p:sp>
+          <p:nvSpPr>
+            <p:cNvPr id="61" name="TextBox 60"/>
+            <p:cNvSpPr txBox="1"/>
+            <p:nvPr/>
+          </p:nvSpPr>
+          <p:spPr>
+            <a:xfrm>
+              <a:off x="463359" y="2258238"/>
+              <a:ext cx="1120382" cy="769441"/>
+            </a:xfrm>
+            <a:prstGeom prst="rect">
+              <a:avLst/>
+            </a:prstGeom>
+            <a:noFill/>
+          </p:spPr>
+          <p:txBody>
+            <a:bodyPr wrap="square" rtlCol="0">
+              <a:spAutoFit/>
+            </a:bodyPr>
+            <a:lstStyle/>
+            <a:p>
+              <a:r>
+                <a:rPr lang="pt-PT" altLang="en-US" sz="1100" dirty="0"/>
+                <a:t>“Quanto mais você jogar, melhor você ficará”</a:t>
+              </a:r>
+            </a:p>
+          </p:txBody>
+        </p:sp>
+      </p:grpSp>
+      <p:grpSp>
+        <p:nvGrpSpPr>
+          <p:cNvPr id="28" name="Agrupar 27">
             <a:extLst>
-              <a:ext uri="{28A0092B-C50C-407E-A947-70E740481C1C}">
-                <a14:useLocalDpi xmlns:a14="http://schemas.microsoft.com/office/drawing/2010/main" val="0"/>
+              <a:ext uri="{FF2B5EF4-FFF2-40B4-BE49-F238E27FC236}">
+                <a16:creationId xmlns:a16="http://schemas.microsoft.com/office/drawing/2014/main" id="{EA36A99A-8625-4FBB-BF71-A24499B77C49}"/>
               </a:ext>
             </a:extLst>
-          </a:blip>
-          <a:stretch>
-            <a:fillRect/>
-          </a:stretch>
-        </p:blipFill>
-        <p:spPr>
-          <a:xfrm>
-            <a:off x="8907851" y="4783652"/>
-            <a:ext cx="1961848" cy="1961848"/>
-          </a:xfrm>
-          <a:prstGeom prst="rect">
-            <a:avLst/>
-          </a:prstGeom>
-        </p:spPr>
-      </p:pic>
-      <p:sp>
-        <p:nvSpPr>
-          <p:cNvPr id="56" name="TextBox 55"/>
+          </p:cNvPr>
+          <p:cNvGrpSpPr/>
+          <p:nvPr/>
+        </p:nvGrpSpPr>
+        <p:grpSpPr>
+          <a:xfrm>
+            <a:off x="7480180" y="1592844"/>
+            <a:ext cx="1659600" cy="1659600"/>
+            <a:chOff x="7167003" y="1447306"/>
+            <a:chExt cx="1659600" cy="1659600"/>
+          </a:xfrm>
+        </p:grpSpPr>
+        <p:pic>
+          <p:nvPicPr>
+            <p:cNvPr id="45" name="Picture 44" descr="A close up of a logo&#10;&#10;Description generated with very high confidence"/>
+            <p:cNvPicPr>
+              <a:picLocks noChangeAspect="1"/>
+            </p:cNvPicPr>
+            <p:nvPr/>
+          </p:nvPicPr>
+          <p:blipFill>
+            <a:blip r:embed="rId3">
+              <a:extLst>
+                <a:ext uri="{28A0092B-C50C-407E-A947-70E740481C1C}">
+                  <a14:useLocalDpi xmlns:a14="http://schemas.microsoft.com/office/drawing/2010/main" val="0"/>
+                </a:ext>
+              </a:extLst>
+            </a:blip>
+            <a:stretch>
+              <a:fillRect/>
+            </a:stretch>
+          </p:blipFill>
+          <p:spPr>
+            <a:xfrm>
+              <a:off x="7167003" y="1447306"/>
+              <a:ext cx="1659600" cy="1659600"/>
+            </a:xfrm>
+            <a:prstGeom prst="rect">
+              <a:avLst/>
+            </a:prstGeom>
+          </p:spPr>
+        </p:pic>
+        <p:sp>
+          <p:nvSpPr>
+            <p:cNvPr id="62" name="TextBox 61"/>
+            <p:cNvSpPr txBox="1"/>
+            <p:nvPr/>
+          </p:nvSpPr>
+          <p:spPr>
+            <a:xfrm>
+              <a:off x="7514929" y="1823564"/>
+              <a:ext cx="983816" cy="938719"/>
+            </a:xfrm>
+            <a:prstGeom prst="rect">
+              <a:avLst/>
+            </a:prstGeom>
+            <a:noFill/>
+          </p:spPr>
+          <p:txBody>
+            <a:bodyPr wrap="square" rtlCol="0">
+              <a:spAutoFit/>
+            </a:bodyPr>
+            <a:lstStyle/>
+            <a:p>
+              <a:r>
+                <a:rPr lang="pt-PT" altLang="pt-BR" sz="1100" dirty="0"/>
+                <a:t>Assiste vídeos e transmissões onlines de jogos</a:t>
+              </a:r>
+            </a:p>
+          </p:txBody>
+        </p:sp>
+      </p:grpSp>
+      <p:grpSp>
+        <p:nvGrpSpPr>
+          <p:cNvPr id="30" name="Agrupar 29">
+            <a:extLst>
+              <a:ext uri="{FF2B5EF4-FFF2-40B4-BE49-F238E27FC236}">
+                <a16:creationId xmlns:a16="http://schemas.microsoft.com/office/drawing/2014/main" id="{E2353478-4446-4EE3-9800-9D2EC4896751}"/>
+              </a:ext>
+            </a:extLst>
+          </p:cNvPr>
+          <p:cNvGrpSpPr/>
+          <p:nvPr/>
+        </p:nvGrpSpPr>
+        <p:grpSpPr>
+          <a:xfrm>
+            <a:off x="10346237" y="373455"/>
+            <a:ext cx="1659600" cy="1659600"/>
+            <a:chOff x="10052835" y="618038"/>
+            <a:chExt cx="1659600" cy="1659600"/>
+          </a:xfrm>
+        </p:grpSpPr>
+        <p:pic>
+          <p:nvPicPr>
+            <p:cNvPr id="43" name="Picture 42" descr="A close up of a logo&#10;&#10;Description generated with very high confidence"/>
+            <p:cNvPicPr>
+              <a:picLocks noChangeAspect="1"/>
+            </p:cNvPicPr>
+            <p:nvPr/>
+          </p:nvPicPr>
+          <p:blipFill>
+            <a:blip r:embed="rId3">
+              <a:extLst>
+                <a:ext uri="{28A0092B-C50C-407E-A947-70E740481C1C}">
+                  <a14:useLocalDpi xmlns:a14="http://schemas.microsoft.com/office/drawing/2010/main" val="0"/>
+                </a:ext>
+              </a:extLst>
+            </a:blip>
+            <a:stretch>
+              <a:fillRect/>
+            </a:stretch>
+          </p:blipFill>
+          <p:spPr>
+            <a:xfrm>
+              <a:off x="10052835" y="618038"/>
+              <a:ext cx="1659600" cy="1659600"/>
+            </a:xfrm>
+            <a:prstGeom prst="rect">
+              <a:avLst/>
+            </a:prstGeom>
+          </p:spPr>
+        </p:pic>
+        <p:sp>
+          <p:nvSpPr>
+            <p:cNvPr id="63" name="TextBox 62"/>
+            <p:cNvSpPr txBox="1"/>
+            <p:nvPr/>
+          </p:nvSpPr>
+          <p:spPr>
+            <a:xfrm>
+              <a:off x="10377796" y="960075"/>
+              <a:ext cx="1104666" cy="430887"/>
+            </a:xfrm>
+            <a:prstGeom prst="rect">
+              <a:avLst/>
+            </a:prstGeom>
+            <a:noFill/>
+          </p:spPr>
+          <p:txBody>
+            <a:bodyPr wrap="square" rtlCol="0">
+              <a:spAutoFit/>
+            </a:bodyPr>
+            <a:lstStyle/>
+            <a:p>
+              <a:r>
+                <a:rPr lang="pt-PT" altLang="en-US" sz="1100" dirty="0"/>
+                <a:t>Assite séries, filmes e animes</a:t>
+              </a:r>
+            </a:p>
+          </p:txBody>
+        </p:sp>
+      </p:grpSp>
+      <p:sp>
+        <p:nvSpPr>
+          <p:cNvPr id="64" name="TextBox 63"/>
           <p:cNvSpPr txBox="1"/>
           <p:nvPr/>
         </p:nvSpPr>
         <p:spPr>
           <a:xfrm>
-            <a:off x="2883550" y="80098"/>
-            <a:ext cx="1120382" cy="829945"/>
+            <a:off x="10436090" y="2640171"/>
+            <a:ext cx="1120382" cy="275590"/>
           </a:xfrm>
           <a:prstGeom prst="rect">
             <a:avLst/>
@@ -4202,843 +4278,1210 @@
           </a:bodyPr>
           <a:lstStyle/>
           <a:p>
-            <a:r>
-              <a:rPr lang="pt-PT" altLang="pt-BR" sz="1200" dirty="0"/>
-              <a:t>”Treinando mais eu alcanço meus objetivos”</a:t>
-            </a:r>
-            <a:endParaRPr lang="pt-PT" altLang="pt-BR" sz="1200" dirty="0"/>
-          </a:p>
-        </p:txBody>
-      </p:sp>
-      <p:sp>
-        <p:nvSpPr>
-          <p:cNvPr id="57" name="TextBox 56"/>
-          <p:cNvSpPr txBox="1"/>
-          <p:nvPr/>
-        </p:nvSpPr>
-        <p:spPr>
-          <a:xfrm>
-            <a:off x="4414502" y="599727"/>
-            <a:ext cx="1120382" cy="1383665"/>
-          </a:xfrm>
-          <a:prstGeom prst="rect">
-            <a:avLst/>
-          </a:prstGeom>
-          <a:noFill/>
-        </p:spPr>
-        <p:txBody>
-          <a:bodyPr wrap="square" rtlCol="0">
-            <a:spAutoFit/>
-          </a:bodyPr>
-          <a:lstStyle/>
-          <a:p>
-            <a:r>
-              <a:rPr lang="pt-PT" altLang="en-US" sz="1200" dirty="0"/>
-              <a:t>“Me interando das novas atualizações melhoro minha gameplay”</a:t>
-            </a:r>
-            <a:endParaRPr lang="pt-PT" altLang="en-US" sz="1200" dirty="0"/>
-          </a:p>
-        </p:txBody>
-      </p:sp>
-      <p:sp>
-        <p:nvSpPr>
-          <p:cNvPr id="58" name="TextBox 57"/>
-          <p:cNvSpPr txBox="1"/>
-          <p:nvPr/>
-        </p:nvSpPr>
-        <p:spPr>
-          <a:xfrm>
-            <a:off x="6528210" y="588245"/>
-            <a:ext cx="1120382" cy="829945"/>
-          </a:xfrm>
-          <a:prstGeom prst="rect">
-            <a:avLst/>
-          </a:prstGeom>
-          <a:noFill/>
-        </p:spPr>
-        <p:txBody>
-          <a:bodyPr wrap="square" rtlCol="0">
-            <a:spAutoFit/>
-          </a:bodyPr>
-          <a:lstStyle/>
-          <a:p>
-            <a:r>
-              <a:rPr lang="pt-PT" altLang="en-US" sz="1200" dirty="0"/>
-              <a:t>“Espero que os jogos fiquem mais acessíveis”</a:t>
-            </a:r>
-            <a:endParaRPr lang="pt-PT" altLang="en-US" sz="1200" dirty="0"/>
-          </a:p>
-        </p:txBody>
-      </p:sp>
-      <p:sp>
-        <p:nvSpPr>
-          <p:cNvPr id="59" name="TextBox 58"/>
-          <p:cNvSpPr txBox="1"/>
-          <p:nvPr/>
-        </p:nvSpPr>
-        <p:spPr>
-          <a:xfrm>
-            <a:off x="537845" y="827405"/>
-            <a:ext cx="1116965" cy="645160"/>
-          </a:xfrm>
-          <a:prstGeom prst="rect">
-            <a:avLst/>
-          </a:prstGeom>
-          <a:noFill/>
-        </p:spPr>
-        <p:txBody>
-          <a:bodyPr wrap="square" rtlCol="0">
-            <a:spAutoFit/>
-          </a:bodyPr>
-          <a:lstStyle/>
-          <a:p>
-            <a:r>
-              <a:rPr lang="pt-PT" altLang="pt-BR" sz="1200" dirty="0"/>
-              <a:t>Tendências dentro dos jogos</a:t>
-            </a:r>
-            <a:endParaRPr lang="pt-PT" altLang="pt-BR" sz="1200" dirty="0"/>
-          </a:p>
-        </p:txBody>
-      </p:sp>
-      <p:sp>
-        <p:nvSpPr>
-          <p:cNvPr id="60" name="TextBox 59"/>
-          <p:cNvSpPr txBox="1"/>
-          <p:nvPr/>
-        </p:nvSpPr>
-        <p:spPr>
-          <a:xfrm>
-            <a:off x="3304757" y="1864250"/>
-            <a:ext cx="1120382" cy="1198880"/>
-          </a:xfrm>
-          <a:prstGeom prst="rect">
-            <a:avLst/>
-          </a:prstGeom>
-          <a:noFill/>
-        </p:spPr>
-        <p:txBody>
-          <a:bodyPr wrap="square" rtlCol="0">
-            <a:spAutoFit/>
-          </a:bodyPr>
-          <a:lstStyle/>
-          <a:p>
-            <a:r>
-              <a:rPr lang="pt-PT" altLang="en-US" sz="1200" dirty="0"/>
-              <a:t>Notícias sobre os lançamentos (equipamentos, atualizações)</a:t>
-            </a:r>
-            <a:endParaRPr lang="pt-PT" altLang="en-US" sz="1200" dirty="0"/>
-          </a:p>
-        </p:txBody>
-      </p:sp>
-      <p:sp>
-        <p:nvSpPr>
-          <p:cNvPr id="61" name="TextBox 60"/>
-          <p:cNvSpPr txBox="1"/>
-          <p:nvPr/>
-        </p:nvSpPr>
-        <p:spPr>
-          <a:xfrm>
-            <a:off x="538277" y="2302195"/>
-            <a:ext cx="1120382" cy="829945"/>
-          </a:xfrm>
-          <a:prstGeom prst="rect">
-            <a:avLst/>
-          </a:prstGeom>
-          <a:noFill/>
-        </p:spPr>
-        <p:txBody>
-          <a:bodyPr wrap="square" rtlCol="0">
-            <a:spAutoFit/>
-          </a:bodyPr>
-          <a:lstStyle/>
-          <a:p>
-            <a:r>
-              <a:rPr lang="pt-PT" altLang="en-US" sz="1200" dirty="0"/>
-              <a:t>“Quanto mais você jogar, melhor você ficará”</a:t>
-            </a:r>
-            <a:endParaRPr lang="pt-PT" altLang="en-US" sz="1200" dirty="0"/>
-          </a:p>
-        </p:txBody>
-      </p:sp>
-      <p:sp>
-        <p:nvSpPr>
-          <p:cNvPr id="62" name="TextBox 61"/>
-          <p:cNvSpPr txBox="1"/>
-          <p:nvPr/>
-        </p:nvSpPr>
-        <p:spPr>
-          <a:xfrm>
-            <a:off x="7629516" y="1895128"/>
-            <a:ext cx="1120382" cy="1014730"/>
-          </a:xfrm>
-          <a:prstGeom prst="rect">
-            <a:avLst/>
-          </a:prstGeom>
-          <a:noFill/>
-        </p:spPr>
-        <p:txBody>
-          <a:bodyPr wrap="square" rtlCol="0">
-            <a:spAutoFit/>
-          </a:bodyPr>
-          <a:lstStyle/>
-          <a:p>
-            <a:r>
-              <a:rPr lang="pt-PT" altLang="pt-BR" sz="1200" dirty="0"/>
-              <a:t>Assiste vídeos e transmissões onlines de jogos</a:t>
-            </a:r>
-            <a:endParaRPr lang="pt-PT" altLang="pt-BR" sz="1200" dirty="0"/>
-          </a:p>
-        </p:txBody>
-      </p:sp>
-      <p:sp>
-        <p:nvSpPr>
-          <p:cNvPr id="63" name="TextBox 62"/>
-          <p:cNvSpPr txBox="1"/>
-          <p:nvPr/>
-        </p:nvSpPr>
-        <p:spPr>
-          <a:xfrm>
-            <a:off x="10477118" y="1048697"/>
-            <a:ext cx="1120382" cy="645160"/>
-          </a:xfrm>
-          <a:prstGeom prst="rect">
-            <a:avLst/>
-          </a:prstGeom>
-          <a:noFill/>
-        </p:spPr>
-        <p:txBody>
-          <a:bodyPr wrap="square" rtlCol="0">
-            <a:spAutoFit/>
-          </a:bodyPr>
-          <a:lstStyle/>
-          <a:p>
-            <a:r>
-              <a:rPr lang="pt-PT" altLang="en-US" sz="1200" dirty="0"/>
-              <a:t>Assite séries, filmes e animes</a:t>
-            </a:r>
-            <a:endParaRPr lang="pt-PT" altLang="en-US" sz="1200" dirty="0"/>
-          </a:p>
-        </p:txBody>
-      </p:sp>
-      <p:sp>
-        <p:nvSpPr>
-          <p:cNvPr id="64" name="TextBox 63"/>
-          <p:cNvSpPr txBox="1"/>
-          <p:nvPr/>
-        </p:nvSpPr>
-        <p:spPr>
-          <a:xfrm>
-            <a:off x="10436090" y="2640171"/>
-            <a:ext cx="1120382" cy="275590"/>
-          </a:xfrm>
-          <a:prstGeom prst="rect">
-            <a:avLst/>
-          </a:prstGeom>
-          <a:noFill/>
-        </p:spPr>
-        <p:txBody>
-          <a:bodyPr wrap="square" rtlCol="0">
-            <a:spAutoFit/>
-          </a:bodyPr>
-          <a:lstStyle/>
-          <a:p>
             <a:endParaRPr lang="en-US" sz="1200" dirty="0"/>
           </a:p>
         </p:txBody>
       </p:sp>
-      <p:sp>
-        <p:nvSpPr>
-          <p:cNvPr id="65" name="TextBox 64"/>
-          <p:cNvSpPr txBox="1"/>
-          <p:nvPr/>
-        </p:nvSpPr>
-        <p:spPr>
-          <a:xfrm>
-            <a:off x="10435590" y="2639060"/>
-            <a:ext cx="1158240" cy="645160"/>
-          </a:xfrm>
-          <a:prstGeom prst="rect">
-            <a:avLst/>
-          </a:prstGeom>
-          <a:noFill/>
-        </p:spPr>
-        <p:txBody>
-          <a:bodyPr wrap="square" rtlCol="0">
-            <a:spAutoFit/>
-          </a:bodyPr>
-          <a:lstStyle/>
-          <a:p>
-            <a:r>
-              <a:rPr lang="pt-PT" altLang="en-US" sz="1200" dirty="0"/>
-              <a:t>Notícias através do Twitter</a:t>
-            </a:r>
-            <a:endParaRPr lang="pt-PT" altLang="en-US" sz="1200" dirty="0"/>
-          </a:p>
-        </p:txBody>
-      </p:sp>
-      <p:sp>
-        <p:nvSpPr>
-          <p:cNvPr id="66" name="TextBox 65"/>
-          <p:cNvSpPr txBox="1"/>
-          <p:nvPr/>
-        </p:nvSpPr>
-        <p:spPr>
-          <a:xfrm>
-            <a:off x="6359403" y="3268203"/>
-            <a:ext cx="1120382" cy="1014730"/>
-          </a:xfrm>
-          <a:prstGeom prst="rect">
-            <a:avLst/>
-          </a:prstGeom>
-          <a:noFill/>
-        </p:spPr>
-        <p:txBody>
-          <a:bodyPr wrap="square" rtlCol="0">
-            <a:spAutoFit/>
-          </a:bodyPr>
-          <a:lstStyle/>
-          <a:p>
-            <a:r>
-              <a:rPr lang="pt-PT" altLang="pt-BR" sz="1200" dirty="0"/>
-              <a:t>Preciso aprender a jogar em determinada posição</a:t>
-            </a:r>
-            <a:endParaRPr lang="pt-PT" altLang="pt-BR" sz="1200" dirty="0"/>
-          </a:p>
-        </p:txBody>
-      </p:sp>
-      <p:sp>
-        <p:nvSpPr>
-          <p:cNvPr id="67" name="TextBox 66"/>
-          <p:cNvSpPr txBox="1"/>
-          <p:nvPr/>
-        </p:nvSpPr>
-        <p:spPr>
-          <a:xfrm>
-            <a:off x="4760516" y="3339046"/>
-            <a:ext cx="1120382" cy="829945"/>
-          </a:xfrm>
-          <a:prstGeom prst="rect">
-            <a:avLst/>
-          </a:prstGeom>
-          <a:noFill/>
-        </p:spPr>
-        <p:txBody>
-          <a:bodyPr wrap="square" rtlCol="0">
-            <a:spAutoFit/>
-          </a:bodyPr>
-          <a:lstStyle/>
-          <a:p>
-            <a:r>
-              <a:rPr lang="pt-PT" altLang="pt-BR" sz="1200" dirty="0"/>
-              <a:t>Preciso estar entre os melhores jogadores</a:t>
-            </a:r>
-            <a:endParaRPr lang="pt-PT" altLang="pt-BR" sz="1200" dirty="0"/>
-          </a:p>
-        </p:txBody>
-      </p:sp>
-      <p:sp>
-        <p:nvSpPr>
-          <p:cNvPr id="68" name="TextBox 67"/>
-          <p:cNvSpPr txBox="1"/>
-          <p:nvPr/>
-        </p:nvSpPr>
-        <p:spPr>
-          <a:xfrm>
-            <a:off x="3099253" y="3672307"/>
-            <a:ext cx="1120382" cy="1198880"/>
-          </a:xfrm>
-          <a:prstGeom prst="rect">
-            <a:avLst/>
-          </a:prstGeom>
-          <a:noFill/>
-        </p:spPr>
-        <p:txBody>
-          <a:bodyPr wrap="square" rtlCol="0">
-            <a:spAutoFit/>
-          </a:bodyPr>
-          <a:lstStyle/>
-          <a:p>
-            <a:r>
-              <a:rPr lang="pt-PT" altLang="pt-BR" sz="1200" dirty="0"/>
-              <a:t>É um pouco tímido e costuma conversar sobre cultura pop</a:t>
-            </a:r>
-            <a:endParaRPr lang="pt-PT" altLang="pt-BR" sz="1200" dirty="0"/>
-          </a:p>
-        </p:txBody>
-      </p:sp>
-      <p:sp>
-        <p:nvSpPr>
-          <p:cNvPr id="69" name="TextBox 68"/>
-          <p:cNvSpPr txBox="1"/>
-          <p:nvPr/>
-        </p:nvSpPr>
-        <p:spPr>
-          <a:xfrm>
-            <a:off x="117300" y="5347538"/>
-            <a:ext cx="1120382" cy="275590"/>
-          </a:xfrm>
-          <a:prstGeom prst="rect">
-            <a:avLst/>
-          </a:prstGeom>
-          <a:noFill/>
-        </p:spPr>
-        <p:txBody>
-          <a:bodyPr wrap="square" rtlCol="0">
-            <a:spAutoFit/>
-          </a:bodyPr>
-          <a:lstStyle/>
-          <a:p>
-            <a:r>
-              <a:rPr lang="pt-PT" altLang="pt-BR" sz="1200" dirty="0"/>
-              <a:t>Conexão ruim</a:t>
-            </a:r>
-            <a:endParaRPr lang="pt-PT" altLang="pt-BR" sz="1200" dirty="0"/>
-          </a:p>
-        </p:txBody>
-      </p:sp>
-      <p:sp>
-        <p:nvSpPr>
-          <p:cNvPr id="70" name="TextBox 69"/>
-          <p:cNvSpPr txBox="1"/>
-          <p:nvPr/>
-        </p:nvSpPr>
-        <p:spPr>
-          <a:xfrm>
-            <a:off x="1699033" y="5281308"/>
-            <a:ext cx="1120382" cy="645160"/>
-          </a:xfrm>
-          <a:prstGeom prst="rect">
-            <a:avLst/>
-          </a:prstGeom>
-          <a:noFill/>
-        </p:spPr>
-        <p:txBody>
-          <a:bodyPr wrap="square" rtlCol="0">
-            <a:spAutoFit/>
-          </a:bodyPr>
-          <a:lstStyle/>
-          <a:p>
-            <a:r>
-              <a:rPr lang="pt-PT" altLang="en-US" sz="1200" dirty="0"/>
-              <a:t>Dificuldade em encontrar times</a:t>
-            </a:r>
-            <a:endParaRPr lang="pt-PT" altLang="en-US" sz="1200" dirty="0"/>
-          </a:p>
-        </p:txBody>
-      </p:sp>
-      <p:sp>
-        <p:nvSpPr>
-          <p:cNvPr id="72" name="TextBox 71"/>
-          <p:cNvSpPr txBox="1"/>
-          <p:nvPr/>
-        </p:nvSpPr>
-        <p:spPr>
-          <a:xfrm>
-            <a:off x="3248738" y="5333442"/>
-            <a:ext cx="1120382" cy="1014730"/>
-          </a:xfrm>
-          <a:prstGeom prst="rect">
-            <a:avLst/>
-          </a:prstGeom>
-          <a:noFill/>
-        </p:spPr>
-        <p:txBody>
-          <a:bodyPr wrap="square" rtlCol="0">
-            <a:spAutoFit/>
-          </a:bodyPr>
-          <a:lstStyle/>
-          <a:p>
-            <a:r>
-              <a:rPr lang="pt-PT" altLang="en-US" sz="1200" dirty="0"/>
-              <a:t>Dificuldade em combinar os jogos com seu calendário</a:t>
-            </a:r>
-            <a:endParaRPr lang="pt-PT" altLang="en-US" sz="1200" dirty="0"/>
-          </a:p>
-        </p:txBody>
-      </p:sp>
-      <p:sp>
-        <p:nvSpPr>
-          <p:cNvPr id="73" name="TextBox 72"/>
-          <p:cNvSpPr txBox="1"/>
-          <p:nvPr/>
-        </p:nvSpPr>
-        <p:spPr>
-          <a:xfrm>
-            <a:off x="6246494" y="5284752"/>
-            <a:ext cx="1120382" cy="645160"/>
-          </a:xfrm>
-          <a:prstGeom prst="rect">
-            <a:avLst/>
-          </a:prstGeom>
-          <a:noFill/>
-        </p:spPr>
-        <p:txBody>
-          <a:bodyPr wrap="square" rtlCol="0">
-            <a:spAutoFit/>
-          </a:bodyPr>
-          <a:lstStyle/>
-          <a:p>
-            <a:r>
-              <a:rPr lang="pt-PT" altLang="pt-BR" sz="1200" dirty="0"/>
-              <a:t>Encontrar times para jogar</a:t>
-            </a:r>
-            <a:endParaRPr lang="pt-PT" altLang="pt-BR" sz="1200" dirty="0"/>
-          </a:p>
-        </p:txBody>
-      </p:sp>
-      <p:pic>
-        <p:nvPicPr>
-          <p:cNvPr id="2" name="Picture 1" descr="A close up of a logo&#10;&#10;Description generated with very high confidence"/>
-          <p:cNvPicPr>
-            <a:picLocks noChangeAspect="1"/>
-          </p:cNvPicPr>
-          <p:nvPr/>
-        </p:nvPicPr>
-        <p:blipFill>
-          <a:blip r:embed="rId1">
+      <p:grpSp>
+        <p:nvGrpSpPr>
+          <p:cNvPr id="31" name="Agrupar 30">
             <a:extLst>
-              <a:ext uri="{28A0092B-C50C-407E-A947-70E740481C1C}">
-                <a14:useLocalDpi xmlns:a14="http://schemas.microsoft.com/office/drawing/2010/main" val="0"/>
+              <a:ext uri="{FF2B5EF4-FFF2-40B4-BE49-F238E27FC236}">
+                <a16:creationId xmlns:a16="http://schemas.microsoft.com/office/drawing/2014/main" id="{E125FF88-C4CE-4634-BF73-20B7A392EC90}"/>
               </a:ext>
             </a:extLst>
-          </a:blip>
-          <a:stretch>
-            <a:fillRect/>
-          </a:stretch>
-        </p:blipFill>
-        <p:spPr>
-          <a:xfrm>
-            <a:off x="7375977" y="3198783"/>
-            <a:ext cx="1961848" cy="1961848"/>
-          </a:xfrm>
-          <a:prstGeom prst="rect">
-            <a:avLst/>
-          </a:prstGeom>
-        </p:spPr>
-      </p:pic>
-      <p:sp>
-        <p:nvSpPr>
-          <p:cNvPr id="3" name="TextBox 65"/>
-          <p:cNvSpPr txBox="1"/>
+          </p:cNvPr>
+          <p:cNvGrpSpPr/>
           <p:nvPr/>
-        </p:nvSpPr>
-        <p:spPr>
-          <a:xfrm>
-            <a:off x="7787518" y="3577448"/>
-            <a:ext cx="1120382" cy="645160"/>
-          </a:xfrm>
-          <a:prstGeom prst="rect">
-            <a:avLst/>
-          </a:prstGeom>
-          <a:noFill/>
-        </p:spPr>
-        <p:txBody>
-          <a:bodyPr wrap="square" rtlCol="0">
-            <a:spAutoFit/>
-          </a:bodyPr>
-          <a:p>
-            <a:r>
-              <a:rPr lang="pt-PT" altLang="pt-BR" sz="1200" dirty="0"/>
-              <a:t>Incentiva as pessoas a seu redor a jogar</a:t>
-            </a:r>
-            <a:endParaRPr lang="pt-PT" altLang="pt-BR" sz="1200" dirty="0"/>
-          </a:p>
-        </p:txBody>
-      </p:sp>
-      <p:pic>
-        <p:nvPicPr>
-          <p:cNvPr id="9" name="Picture 8" descr="A close up of a logo&#10;&#10;Description generated with very high confidence"/>
-          <p:cNvPicPr>
-            <a:picLocks noChangeAspect="1"/>
-          </p:cNvPicPr>
-          <p:nvPr/>
-        </p:nvPicPr>
-        <p:blipFill>
-          <a:blip r:embed="rId1">
+        </p:nvGrpSpPr>
+        <p:grpSpPr>
+          <a:xfrm>
+            <a:off x="10401013" y="2762881"/>
+            <a:ext cx="1659600" cy="1659600"/>
+            <a:chOff x="10014154" y="2217000"/>
+            <a:chExt cx="1659600" cy="1659600"/>
+          </a:xfrm>
+        </p:grpSpPr>
+        <p:pic>
+          <p:nvPicPr>
+            <p:cNvPr id="44" name="Picture 43" descr="A close up of a logo&#10;&#10;Description generated with very high confidence"/>
+            <p:cNvPicPr>
+              <a:picLocks noChangeAspect="1"/>
+            </p:cNvPicPr>
+            <p:nvPr/>
+          </p:nvPicPr>
+          <p:blipFill>
+            <a:blip r:embed="rId3">
+              <a:extLst>
+                <a:ext uri="{28A0092B-C50C-407E-A947-70E740481C1C}">
+                  <a14:useLocalDpi xmlns:a14="http://schemas.microsoft.com/office/drawing/2010/main" val="0"/>
+                </a:ext>
+              </a:extLst>
+            </a:blip>
+            <a:stretch>
+              <a:fillRect/>
+            </a:stretch>
+          </p:blipFill>
+          <p:spPr>
+            <a:xfrm>
+              <a:off x="10014154" y="2217000"/>
+              <a:ext cx="1659600" cy="1659600"/>
+            </a:xfrm>
+            <a:prstGeom prst="rect">
+              <a:avLst/>
+            </a:prstGeom>
+          </p:spPr>
+        </p:pic>
+        <p:sp>
+          <p:nvSpPr>
+            <p:cNvPr id="65" name="TextBox 64"/>
+            <p:cNvSpPr txBox="1"/>
+            <p:nvPr/>
+          </p:nvSpPr>
+          <p:spPr>
+            <a:xfrm>
+              <a:off x="10318808" y="2543011"/>
+              <a:ext cx="1158240" cy="430887"/>
+            </a:xfrm>
+            <a:prstGeom prst="rect">
+              <a:avLst/>
+            </a:prstGeom>
+            <a:noFill/>
+          </p:spPr>
+          <p:txBody>
+            <a:bodyPr wrap="square" rtlCol="0">
+              <a:spAutoFit/>
+            </a:bodyPr>
+            <a:lstStyle/>
+            <a:p>
+              <a:r>
+                <a:rPr lang="pt-PT" altLang="en-US" sz="1100" dirty="0"/>
+                <a:t>Notícias através do Twitter</a:t>
+              </a:r>
+            </a:p>
+          </p:txBody>
+        </p:sp>
+      </p:grpSp>
+      <p:grpSp>
+        <p:nvGrpSpPr>
+          <p:cNvPr id="33" name="Agrupar 32">
             <a:extLst>
-              <a:ext uri="{28A0092B-C50C-407E-A947-70E740481C1C}">
-                <a14:useLocalDpi xmlns:a14="http://schemas.microsoft.com/office/drawing/2010/main" val="0"/>
+              <a:ext uri="{FF2B5EF4-FFF2-40B4-BE49-F238E27FC236}">
+                <a16:creationId xmlns:a16="http://schemas.microsoft.com/office/drawing/2014/main" id="{247D05F1-C736-4BBC-9848-90A95172F3B7}"/>
               </a:ext>
             </a:extLst>
-          </a:blip>
-          <a:stretch>
-            <a:fillRect/>
-          </a:stretch>
-        </p:blipFill>
-        <p:spPr>
-          <a:xfrm>
-            <a:off x="8596630" y="960075"/>
-            <a:ext cx="1961848" cy="1961848"/>
-          </a:xfrm>
-          <a:prstGeom prst="rect">
-            <a:avLst/>
-          </a:prstGeom>
-        </p:spPr>
-      </p:pic>
-      <p:sp>
-        <p:nvSpPr>
-          <p:cNvPr id="10" name="TextBox 61"/>
-          <p:cNvSpPr txBox="1"/>
+          </p:cNvPr>
+          <p:cNvGrpSpPr/>
           <p:nvPr/>
-        </p:nvSpPr>
-        <p:spPr>
-          <a:xfrm>
-            <a:off x="9016991" y="1382683"/>
-            <a:ext cx="1120382" cy="1383665"/>
-          </a:xfrm>
-          <a:prstGeom prst="rect">
-            <a:avLst/>
-          </a:prstGeom>
-          <a:noFill/>
-        </p:spPr>
-        <p:txBody>
-          <a:bodyPr wrap="square" rtlCol="0">
-            <a:spAutoFit/>
-          </a:bodyPr>
-          <a:p>
-            <a:r>
-              <a:rPr lang="pt-PT" altLang="pt-BR" sz="1200" dirty="0"/>
-              <a:t>Mercado tentando manter o usuário através de atualizações e expansões</a:t>
-            </a:r>
-            <a:endParaRPr lang="pt-PT" altLang="pt-BR" sz="1200" dirty="0"/>
-          </a:p>
-        </p:txBody>
-      </p:sp>
-      <p:pic>
-        <p:nvPicPr>
-          <p:cNvPr id="11" name="Picture 10" descr="A close up of a logo&#10;&#10;Description generated with very high confidence"/>
-          <p:cNvPicPr>
-            <a:picLocks noChangeAspect="1"/>
-          </p:cNvPicPr>
-          <p:nvPr/>
-        </p:nvPicPr>
-        <p:blipFill>
-          <a:blip r:embed="rId1">
+        </p:nvGrpSpPr>
+        <p:grpSpPr>
+          <a:xfrm>
+            <a:off x="5945241" y="3003539"/>
+            <a:ext cx="1659600" cy="1659600"/>
+            <a:chOff x="5947862" y="2889538"/>
+            <a:chExt cx="1659600" cy="1659600"/>
+          </a:xfrm>
+        </p:grpSpPr>
+        <p:pic>
+          <p:nvPicPr>
+            <p:cNvPr id="47" name="Picture 46" descr="A close up of a logo&#10;&#10;Description generated with very high confidence"/>
+            <p:cNvPicPr>
+              <a:picLocks noChangeAspect="1"/>
+            </p:cNvPicPr>
+            <p:nvPr/>
+          </p:nvPicPr>
+          <p:blipFill>
+            <a:blip r:embed="rId3">
+              <a:extLst>
+                <a:ext uri="{28A0092B-C50C-407E-A947-70E740481C1C}">
+                  <a14:useLocalDpi xmlns:a14="http://schemas.microsoft.com/office/drawing/2010/main" val="0"/>
+                </a:ext>
+              </a:extLst>
+            </a:blip>
+            <a:stretch>
+              <a:fillRect/>
+            </a:stretch>
+          </p:blipFill>
+          <p:spPr>
+            <a:xfrm>
+              <a:off x="5947862" y="2889538"/>
+              <a:ext cx="1659600" cy="1659600"/>
+            </a:xfrm>
+            <a:prstGeom prst="rect">
+              <a:avLst/>
+            </a:prstGeom>
+          </p:spPr>
+        </p:pic>
+        <p:sp>
+          <p:nvSpPr>
+            <p:cNvPr id="66" name="TextBox 65"/>
+            <p:cNvSpPr txBox="1"/>
+            <p:nvPr/>
+          </p:nvSpPr>
+          <p:spPr>
+            <a:xfrm>
+              <a:off x="6255595" y="3189852"/>
+              <a:ext cx="1120382" cy="938719"/>
+            </a:xfrm>
+            <a:prstGeom prst="rect">
+              <a:avLst/>
+            </a:prstGeom>
+            <a:noFill/>
+          </p:spPr>
+          <p:txBody>
+            <a:bodyPr wrap="square" rtlCol="0">
+              <a:spAutoFit/>
+            </a:bodyPr>
+            <a:lstStyle/>
+            <a:p>
+              <a:r>
+                <a:rPr lang="pt-PT" altLang="pt-BR" sz="1100" dirty="0"/>
+                <a:t>Preciso aprender a jogar em determinada posição</a:t>
+              </a:r>
+            </a:p>
+          </p:txBody>
+        </p:sp>
+      </p:grpSp>
+      <p:grpSp>
+        <p:nvGrpSpPr>
+          <p:cNvPr id="40" name="Agrupar 39">
             <a:extLst>
-              <a:ext uri="{28A0092B-C50C-407E-A947-70E740481C1C}">
-                <a14:useLocalDpi xmlns:a14="http://schemas.microsoft.com/office/drawing/2010/main" val="0"/>
+              <a:ext uri="{FF2B5EF4-FFF2-40B4-BE49-F238E27FC236}">
+                <a16:creationId xmlns:a16="http://schemas.microsoft.com/office/drawing/2014/main" id="{DC926A19-5CDB-43CE-9D83-2F8599634C31}"/>
               </a:ext>
             </a:extLst>
-          </a:blip>
-          <a:stretch>
-            <a:fillRect/>
-          </a:stretch>
-        </p:blipFill>
-        <p:spPr>
-          <a:xfrm>
-            <a:off x="1510988" y="1284082"/>
-            <a:ext cx="1961848" cy="1961848"/>
-          </a:xfrm>
-          <a:prstGeom prst="rect">
-            <a:avLst/>
-          </a:prstGeom>
-        </p:spPr>
-      </p:pic>
-      <p:sp>
-        <p:nvSpPr>
-          <p:cNvPr id="12" name="TextBox 59"/>
-          <p:cNvSpPr txBox="1"/>
+          </p:cNvPr>
+          <p:cNvGrpSpPr/>
           <p:nvPr/>
-        </p:nvSpPr>
-        <p:spPr>
-          <a:xfrm>
-            <a:off x="1921727" y="1711215"/>
-            <a:ext cx="1120382" cy="460375"/>
-          </a:xfrm>
-          <a:prstGeom prst="rect">
-            <a:avLst/>
-          </a:prstGeom>
-          <a:noFill/>
-        </p:spPr>
-        <p:txBody>
-          <a:bodyPr wrap="square" rtlCol="0">
-            <a:spAutoFit/>
-          </a:bodyPr>
-          <a:p>
-            <a:r>
-              <a:rPr lang="pt-PT" altLang="en-US" sz="1200" dirty="0"/>
-              <a:t>Recomendções e dicas</a:t>
-            </a:r>
-            <a:endParaRPr lang="pt-PT" altLang="en-US" sz="1200" dirty="0"/>
-          </a:p>
-        </p:txBody>
-      </p:sp>
-      <p:pic>
-        <p:nvPicPr>
-          <p:cNvPr id="13" name="Picture 12" descr="A close up of a logo&#10;&#10;Description generated with very high confidence"/>
-          <p:cNvPicPr>
-            <a:picLocks noChangeAspect="1"/>
-          </p:cNvPicPr>
-          <p:nvPr/>
-        </p:nvPicPr>
-        <p:blipFill>
-          <a:blip r:embed="rId1">
+        </p:nvGrpSpPr>
+        <p:grpSpPr>
+          <a:xfrm>
+            <a:off x="4315348" y="3003539"/>
+            <a:ext cx="1659600" cy="1659600"/>
+            <a:chOff x="4344185" y="2922005"/>
+            <a:chExt cx="1659600" cy="1659600"/>
+          </a:xfrm>
+        </p:grpSpPr>
+        <p:pic>
+          <p:nvPicPr>
+            <p:cNvPr id="48" name="Picture 47" descr="A close up of a logo&#10;&#10;Description generated with very high confidence"/>
+            <p:cNvPicPr>
+              <a:picLocks noChangeAspect="1"/>
+            </p:cNvPicPr>
+            <p:nvPr/>
+          </p:nvPicPr>
+          <p:blipFill>
+            <a:blip r:embed="rId3">
+              <a:extLst>
+                <a:ext uri="{28A0092B-C50C-407E-A947-70E740481C1C}">
+                  <a14:useLocalDpi xmlns:a14="http://schemas.microsoft.com/office/drawing/2010/main" val="0"/>
+                </a:ext>
+              </a:extLst>
+            </a:blip>
+            <a:stretch>
+              <a:fillRect/>
+            </a:stretch>
+          </p:blipFill>
+          <p:spPr>
+            <a:xfrm>
+              <a:off x="4344185" y="2922005"/>
+              <a:ext cx="1659600" cy="1659600"/>
+            </a:xfrm>
+            <a:prstGeom prst="rect">
+              <a:avLst/>
+            </a:prstGeom>
+          </p:spPr>
+        </p:pic>
+        <p:sp>
+          <p:nvSpPr>
+            <p:cNvPr id="67" name="TextBox 66"/>
+            <p:cNvSpPr txBox="1"/>
+            <p:nvPr/>
+          </p:nvSpPr>
+          <p:spPr>
+            <a:xfrm>
+              <a:off x="4674575" y="3221364"/>
+              <a:ext cx="1120382" cy="769441"/>
+            </a:xfrm>
+            <a:prstGeom prst="rect">
+              <a:avLst/>
+            </a:prstGeom>
+            <a:noFill/>
+          </p:spPr>
+          <p:txBody>
+            <a:bodyPr wrap="square" rtlCol="0">
+              <a:spAutoFit/>
+            </a:bodyPr>
+            <a:lstStyle/>
+            <a:p>
+              <a:r>
+                <a:rPr lang="pt-PT" altLang="pt-BR" sz="1100" dirty="0"/>
+                <a:t>Preciso estar entre os melhores jogadores</a:t>
+              </a:r>
+            </a:p>
+          </p:txBody>
+        </p:sp>
+      </p:grpSp>
+      <p:grpSp>
+        <p:nvGrpSpPr>
+          <p:cNvPr id="41" name="Agrupar 40">
             <a:extLst>
-              <a:ext uri="{28A0092B-C50C-407E-A947-70E740481C1C}">
-                <a14:useLocalDpi xmlns:a14="http://schemas.microsoft.com/office/drawing/2010/main" val="0"/>
+              <a:ext uri="{FF2B5EF4-FFF2-40B4-BE49-F238E27FC236}">
+                <a16:creationId xmlns:a16="http://schemas.microsoft.com/office/drawing/2014/main" id="{5ED7EB03-B8EF-4348-A111-C0B44CE7D7F8}"/>
               </a:ext>
             </a:extLst>
-          </a:blip>
-          <a:stretch>
-            <a:fillRect/>
-          </a:stretch>
-        </p:blipFill>
-        <p:spPr>
-          <a:xfrm>
-            <a:off x="7910345" y="-324727"/>
-            <a:ext cx="1961848" cy="1961848"/>
-          </a:xfrm>
-          <a:prstGeom prst="rect">
-            <a:avLst/>
-          </a:prstGeom>
-        </p:spPr>
-      </p:pic>
-      <p:sp>
-        <p:nvSpPr>
-          <p:cNvPr id="14" name="TextBox 57"/>
-          <p:cNvSpPr txBox="1"/>
+          </p:cNvPr>
+          <p:cNvGrpSpPr/>
           <p:nvPr/>
-        </p:nvSpPr>
-        <p:spPr>
-          <a:xfrm>
-            <a:off x="8341135" y="94850"/>
-            <a:ext cx="1120382" cy="829945"/>
-          </a:xfrm>
-          <a:prstGeom prst="rect">
-            <a:avLst/>
-          </a:prstGeom>
-          <a:noFill/>
-        </p:spPr>
-        <p:txBody>
-          <a:bodyPr wrap="square" rtlCol="0">
-            <a:spAutoFit/>
-          </a:bodyPr>
-          <a:p>
-            <a:r>
-              <a:rPr lang="pt-PT" altLang="en-US" sz="1200" dirty="0"/>
-              <a:t>Preciso de mais tempo para fazer o que gosto</a:t>
-            </a:r>
-            <a:endParaRPr lang="pt-PT" altLang="en-US" sz="1200" dirty="0"/>
-          </a:p>
-        </p:txBody>
-      </p:sp>
-      <p:sp>
-        <p:nvSpPr>
-          <p:cNvPr id="16" name="TextBox 72"/>
-          <p:cNvSpPr txBox="1"/>
-          <p:nvPr/>
-        </p:nvSpPr>
-        <p:spPr>
-          <a:xfrm>
-            <a:off x="7787639" y="5257447"/>
-            <a:ext cx="1120382" cy="1014730"/>
-          </a:xfrm>
-          <a:prstGeom prst="rect">
-            <a:avLst/>
-          </a:prstGeom>
-          <a:noFill/>
-        </p:spPr>
-        <p:txBody>
-          <a:bodyPr wrap="square" rtlCol="0">
-            <a:spAutoFit/>
-          </a:bodyPr>
-          <a:p>
-            <a:r>
-              <a:rPr lang="pt-PT" altLang="pt-BR" sz="1200" dirty="0"/>
-              <a:t>Uma máquina em que eu consiga ter uma melhor performance</a:t>
-            </a:r>
-            <a:endParaRPr lang="pt-PT" altLang="pt-BR" sz="1200" dirty="0"/>
-          </a:p>
-        </p:txBody>
-      </p:sp>
-      <p:sp>
-        <p:nvSpPr>
-          <p:cNvPr id="17" name="TextBox 72"/>
-          <p:cNvSpPr txBox="1"/>
-          <p:nvPr/>
-        </p:nvSpPr>
-        <p:spPr>
-          <a:xfrm>
-            <a:off x="9328784" y="5213632"/>
-            <a:ext cx="1120382" cy="460375"/>
-          </a:xfrm>
-          <a:prstGeom prst="rect">
-            <a:avLst/>
-          </a:prstGeom>
-          <a:noFill/>
-        </p:spPr>
-        <p:txBody>
-          <a:bodyPr wrap="square" rtlCol="0">
-            <a:spAutoFit/>
-          </a:bodyPr>
-          <a:p>
-            <a:r>
-              <a:rPr lang="pt-PT" altLang="pt-BR" sz="1200" dirty="0"/>
-              <a:t>Ambiente silencioso</a:t>
-            </a:r>
-            <a:endParaRPr lang="pt-PT" altLang="pt-BR" sz="1200" dirty="0"/>
-          </a:p>
-        </p:txBody>
-      </p:sp>
-      <p:pic>
-        <p:nvPicPr>
-          <p:cNvPr id="18" name="Picture 17" descr="A close up of a logo&#10;&#10;Description generated with very high confidence"/>
-          <p:cNvPicPr>
-            <a:picLocks noChangeAspect="1"/>
-          </p:cNvPicPr>
-          <p:nvPr/>
-        </p:nvPicPr>
-        <p:blipFill>
-          <a:blip r:embed="rId1">
+        </p:nvGrpSpPr>
+        <p:grpSpPr>
+          <a:xfrm>
+            <a:off x="2643186" y="3422697"/>
+            <a:ext cx="1659600" cy="1659600"/>
+            <a:chOff x="2668797" y="3245958"/>
+            <a:chExt cx="1659600" cy="1659600"/>
+          </a:xfrm>
+        </p:grpSpPr>
+        <p:pic>
+          <p:nvPicPr>
+            <p:cNvPr id="49" name="Picture 48" descr="A close up of a logo&#10;&#10;Description generated with very high confidence"/>
+            <p:cNvPicPr>
+              <a:picLocks noChangeAspect="1"/>
+            </p:cNvPicPr>
+            <p:nvPr/>
+          </p:nvPicPr>
+          <p:blipFill>
+            <a:blip r:embed="rId3">
+              <a:extLst>
+                <a:ext uri="{28A0092B-C50C-407E-A947-70E740481C1C}">
+                  <a14:useLocalDpi xmlns:a14="http://schemas.microsoft.com/office/drawing/2010/main" val="0"/>
+                </a:ext>
+              </a:extLst>
+            </a:blip>
+            <a:stretch>
+              <a:fillRect/>
+            </a:stretch>
+          </p:blipFill>
+          <p:spPr>
+            <a:xfrm>
+              <a:off x="2668797" y="3245958"/>
+              <a:ext cx="1659600" cy="1659600"/>
+            </a:xfrm>
+            <a:prstGeom prst="rect">
+              <a:avLst/>
+            </a:prstGeom>
+          </p:spPr>
+        </p:pic>
+        <p:sp>
+          <p:nvSpPr>
+            <p:cNvPr id="68" name="TextBox 67"/>
+            <p:cNvSpPr txBox="1"/>
+            <p:nvPr/>
+          </p:nvSpPr>
+          <p:spPr>
+            <a:xfrm>
+              <a:off x="2982156" y="3551598"/>
+              <a:ext cx="1120382" cy="938719"/>
+            </a:xfrm>
+            <a:prstGeom prst="rect">
+              <a:avLst/>
+            </a:prstGeom>
+            <a:noFill/>
+          </p:spPr>
+          <p:txBody>
+            <a:bodyPr wrap="square" rtlCol="0">
+              <a:spAutoFit/>
+            </a:bodyPr>
+            <a:lstStyle/>
+            <a:p>
+              <a:r>
+                <a:rPr lang="pt-PT" altLang="pt-BR" sz="1100" dirty="0"/>
+                <a:t>É um pouco tímido e costuma conversar sobre cultura pop</a:t>
+              </a:r>
+            </a:p>
+          </p:txBody>
+        </p:sp>
+      </p:grpSp>
+      <p:grpSp>
+        <p:nvGrpSpPr>
+          <p:cNvPr id="76" name="Agrupar 75">
             <a:extLst>
-              <a:ext uri="{28A0092B-C50C-407E-A947-70E740481C1C}">
-                <a14:useLocalDpi xmlns:a14="http://schemas.microsoft.com/office/drawing/2010/main" val="0"/>
+              <a:ext uri="{FF2B5EF4-FFF2-40B4-BE49-F238E27FC236}">
+                <a16:creationId xmlns:a16="http://schemas.microsoft.com/office/drawing/2014/main" id="{7C3066E5-1CBC-461D-A7C0-641D469F8CB0}"/>
               </a:ext>
             </a:extLst>
-          </a:blip>
-          <a:stretch>
-            <a:fillRect/>
-          </a:stretch>
-        </p:blipFill>
-        <p:spPr>
-          <a:xfrm>
-            <a:off x="10476936" y="4814767"/>
-            <a:ext cx="1961848" cy="1961848"/>
-          </a:xfrm>
-          <a:prstGeom prst="rect">
-            <a:avLst/>
-          </a:prstGeom>
-        </p:spPr>
-      </p:pic>
-      <p:sp>
-        <p:nvSpPr>
-          <p:cNvPr id="22" name="TextBox 72"/>
-          <p:cNvSpPr txBox="1"/>
+          </p:cNvPr>
+          <p:cNvGrpSpPr/>
           <p:nvPr/>
-        </p:nvSpPr>
-        <p:spPr>
-          <a:xfrm>
-            <a:off x="10897869" y="5244747"/>
-            <a:ext cx="1120382" cy="829945"/>
-          </a:xfrm>
-          <a:prstGeom prst="rect">
-            <a:avLst/>
-          </a:prstGeom>
-          <a:noFill/>
-        </p:spPr>
-        <p:txBody>
-          <a:bodyPr wrap="square" rtlCol="0">
-            <a:spAutoFit/>
-          </a:bodyPr>
-          <a:p>
-            <a:r>
-              <a:rPr lang="pt-PT" altLang="pt-BR" sz="1200" dirty="0"/>
-              <a:t>Otimizar melhor seu tempo disponível</a:t>
-            </a:r>
-            <a:endParaRPr lang="pt-PT" altLang="pt-BR" sz="1200" dirty="0"/>
-          </a:p>
-        </p:txBody>
-      </p:sp>
+        </p:nvGrpSpPr>
+        <p:grpSpPr>
+          <a:xfrm>
+            <a:off x="310511" y="5033010"/>
+            <a:ext cx="1659600" cy="1659600"/>
+            <a:chOff x="-303433" y="4906347"/>
+            <a:chExt cx="1659600" cy="1659600"/>
+          </a:xfrm>
+        </p:grpSpPr>
+        <p:pic>
+          <p:nvPicPr>
+            <p:cNvPr id="50" name="Picture 49" descr="A close up of a logo&#10;&#10;Description generated with very high confidence"/>
+            <p:cNvPicPr>
+              <a:picLocks noChangeAspect="1"/>
+            </p:cNvPicPr>
+            <p:nvPr/>
+          </p:nvPicPr>
+          <p:blipFill>
+            <a:blip r:embed="rId3">
+              <a:extLst>
+                <a:ext uri="{28A0092B-C50C-407E-A947-70E740481C1C}">
+                  <a14:useLocalDpi xmlns:a14="http://schemas.microsoft.com/office/drawing/2010/main" val="0"/>
+                </a:ext>
+              </a:extLst>
+            </a:blip>
+            <a:stretch>
+              <a:fillRect/>
+            </a:stretch>
+          </p:blipFill>
+          <p:spPr>
+            <a:xfrm>
+              <a:off x="-303433" y="4906347"/>
+              <a:ext cx="1659600" cy="1659600"/>
+            </a:xfrm>
+            <a:prstGeom prst="rect">
+              <a:avLst/>
+            </a:prstGeom>
+          </p:spPr>
+        </p:pic>
+        <p:sp>
+          <p:nvSpPr>
+            <p:cNvPr id="69" name="TextBox 68"/>
+            <p:cNvSpPr txBox="1"/>
+            <p:nvPr/>
+          </p:nvSpPr>
+          <p:spPr>
+            <a:xfrm>
+              <a:off x="34389" y="5278393"/>
+              <a:ext cx="1120382" cy="261610"/>
+            </a:xfrm>
+            <a:prstGeom prst="rect">
+              <a:avLst/>
+            </a:prstGeom>
+            <a:noFill/>
+          </p:spPr>
+          <p:txBody>
+            <a:bodyPr wrap="square" rtlCol="0">
+              <a:spAutoFit/>
+            </a:bodyPr>
+            <a:lstStyle/>
+            <a:p>
+              <a:r>
+                <a:rPr lang="pt-PT" altLang="pt-BR" sz="1100" dirty="0"/>
+                <a:t>Conexão ruim</a:t>
+              </a:r>
+            </a:p>
+          </p:txBody>
+        </p:sp>
+      </p:grpSp>
+      <p:grpSp>
+        <p:nvGrpSpPr>
+          <p:cNvPr id="77" name="Agrupar 76">
+            <a:extLst>
+              <a:ext uri="{FF2B5EF4-FFF2-40B4-BE49-F238E27FC236}">
+                <a16:creationId xmlns:a16="http://schemas.microsoft.com/office/drawing/2014/main" id="{B710DFBB-A629-44B5-A60E-55A8BCB2C8C2}"/>
+              </a:ext>
+            </a:extLst>
+          </p:cNvPr>
+          <p:cNvGrpSpPr/>
+          <p:nvPr/>
+        </p:nvGrpSpPr>
+        <p:grpSpPr>
+          <a:xfrm>
+            <a:off x="2240349" y="5033010"/>
+            <a:ext cx="1659600" cy="1659600"/>
+            <a:chOff x="1237814" y="4906796"/>
+            <a:chExt cx="1659600" cy="1659600"/>
+          </a:xfrm>
+        </p:grpSpPr>
+        <p:pic>
+          <p:nvPicPr>
+            <p:cNvPr id="51" name="Picture 50" descr="A close up of a logo&#10;&#10;Description generated with very high confidence"/>
+            <p:cNvPicPr>
+              <a:picLocks noChangeAspect="1"/>
+            </p:cNvPicPr>
+            <p:nvPr/>
+          </p:nvPicPr>
+          <p:blipFill>
+            <a:blip r:embed="rId3">
+              <a:extLst>
+                <a:ext uri="{28A0092B-C50C-407E-A947-70E740481C1C}">
+                  <a14:useLocalDpi xmlns:a14="http://schemas.microsoft.com/office/drawing/2010/main" val="0"/>
+                </a:ext>
+              </a:extLst>
+            </a:blip>
+            <a:stretch>
+              <a:fillRect/>
+            </a:stretch>
+          </p:blipFill>
+          <p:spPr>
+            <a:xfrm>
+              <a:off x="1237814" y="4906796"/>
+              <a:ext cx="1659600" cy="1659600"/>
+            </a:xfrm>
+            <a:prstGeom prst="rect">
+              <a:avLst/>
+            </a:prstGeom>
+          </p:spPr>
+        </p:pic>
+        <p:sp>
+          <p:nvSpPr>
+            <p:cNvPr id="70" name="TextBox 69"/>
+            <p:cNvSpPr txBox="1"/>
+            <p:nvPr/>
+          </p:nvSpPr>
+          <p:spPr>
+            <a:xfrm>
+              <a:off x="1540590" y="5235573"/>
+              <a:ext cx="1120382" cy="430887"/>
+            </a:xfrm>
+            <a:prstGeom prst="rect">
+              <a:avLst/>
+            </a:prstGeom>
+            <a:noFill/>
+          </p:spPr>
+          <p:txBody>
+            <a:bodyPr wrap="square" rtlCol="0">
+              <a:spAutoFit/>
+            </a:bodyPr>
+            <a:lstStyle/>
+            <a:p>
+              <a:r>
+                <a:rPr lang="pt-PT" altLang="en-US" sz="1100" dirty="0"/>
+                <a:t>Dificuldade em encontrar times</a:t>
+              </a:r>
+            </a:p>
+          </p:txBody>
+        </p:sp>
+      </p:grpSp>
+      <p:grpSp>
+        <p:nvGrpSpPr>
+          <p:cNvPr id="78" name="Agrupar 77">
+            <a:extLst>
+              <a:ext uri="{FF2B5EF4-FFF2-40B4-BE49-F238E27FC236}">
+                <a16:creationId xmlns:a16="http://schemas.microsoft.com/office/drawing/2014/main" id="{DEFBD09D-E6AD-486B-88AE-9AD688CC1A0D}"/>
+              </a:ext>
+            </a:extLst>
+          </p:cNvPr>
+          <p:cNvGrpSpPr/>
+          <p:nvPr/>
+        </p:nvGrpSpPr>
+        <p:grpSpPr>
+          <a:xfrm>
+            <a:off x="4031275" y="5004813"/>
+            <a:ext cx="1659600" cy="1659600"/>
+            <a:chOff x="2819297" y="4906544"/>
+            <a:chExt cx="1659600" cy="1659600"/>
+          </a:xfrm>
+        </p:grpSpPr>
+        <p:pic>
+          <p:nvPicPr>
+            <p:cNvPr id="52" name="Picture 51" descr="A close up of a logo&#10;&#10;Description generated with very high confidence"/>
+            <p:cNvPicPr>
+              <a:picLocks noChangeAspect="1"/>
+            </p:cNvPicPr>
+            <p:nvPr/>
+          </p:nvPicPr>
+          <p:blipFill>
+            <a:blip r:embed="rId3">
+              <a:extLst>
+                <a:ext uri="{28A0092B-C50C-407E-A947-70E740481C1C}">
+                  <a14:useLocalDpi xmlns:a14="http://schemas.microsoft.com/office/drawing/2010/main" val="0"/>
+                </a:ext>
+              </a:extLst>
+            </a:blip>
+            <a:stretch>
+              <a:fillRect/>
+            </a:stretch>
+          </p:blipFill>
+          <p:spPr>
+            <a:xfrm>
+              <a:off x="2819297" y="4906544"/>
+              <a:ext cx="1659600" cy="1659600"/>
+            </a:xfrm>
+            <a:prstGeom prst="rect">
+              <a:avLst/>
+            </a:prstGeom>
+          </p:spPr>
+        </p:pic>
+        <p:sp>
+          <p:nvSpPr>
+            <p:cNvPr id="72" name="TextBox 71"/>
+            <p:cNvSpPr txBox="1"/>
+            <p:nvPr/>
+          </p:nvSpPr>
+          <p:spPr>
+            <a:xfrm>
+              <a:off x="3170781" y="5251390"/>
+              <a:ext cx="1120382" cy="769441"/>
+            </a:xfrm>
+            <a:prstGeom prst="rect">
+              <a:avLst/>
+            </a:prstGeom>
+            <a:noFill/>
+          </p:spPr>
+          <p:txBody>
+            <a:bodyPr wrap="square" rtlCol="0">
+              <a:spAutoFit/>
+            </a:bodyPr>
+            <a:lstStyle/>
+            <a:p>
+              <a:r>
+                <a:rPr lang="pt-PT" altLang="en-US" sz="1100" dirty="0"/>
+                <a:t>Dificuldade em combinar os jogos com seu calendário</a:t>
+              </a:r>
+            </a:p>
+          </p:txBody>
+        </p:sp>
+      </p:grpSp>
+      <p:grpSp>
+        <p:nvGrpSpPr>
+          <p:cNvPr id="79" name="Agrupar 78">
+            <a:extLst>
+              <a:ext uri="{FF2B5EF4-FFF2-40B4-BE49-F238E27FC236}">
+                <a16:creationId xmlns:a16="http://schemas.microsoft.com/office/drawing/2014/main" id="{BE4D3369-C964-4FD3-8A50-F150C691A9C5}"/>
+              </a:ext>
+            </a:extLst>
+          </p:cNvPr>
+          <p:cNvGrpSpPr/>
+          <p:nvPr/>
+        </p:nvGrpSpPr>
+        <p:grpSpPr>
+          <a:xfrm>
+            <a:off x="6019528" y="5038842"/>
+            <a:ext cx="1659600" cy="1659600"/>
+            <a:chOff x="5825761" y="4859655"/>
+            <a:chExt cx="1659600" cy="1659600"/>
+          </a:xfrm>
+        </p:grpSpPr>
+        <p:pic>
+          <p:nvPicPr>
+            <p:cNvPr id="53" name="Picture 52" descr="A close up of a logo&#10;&#10;Description generated with very high confidence"/>
+            <p:cNvPicPr>
+              <a:picLocks noChangeAspect="1"/>
+            </p:cNvPicPr>
+            <p:nvPr/>
+          </p:nvPicPr>
+          <p:blipFill>
+            <a:blip r:embed="rId3">
+              <a:extLst>
+                <a:ext uri="{28A0092B-C50C-407E-A947-70E740481C1C}">
+                  <a14:useLocalDpi xmlns:a14="http://schemas.microsoft.com/office/drawing/2010/main" val="0"/>
+                </a:ext>
+              </a:extLst>
+            </a:blip>
+            <a:stretch>
+              <a:fillRect/>
+            </a:stretch>
+          </p:blipFill>
+          <p:spPr>
+            <a:xfrm>
+              <a:off x="5825761" y="4859655"/>
+              <a:ext cx="1659600" cy="1659600"/>
+            </a:xfrm>
+            <a:prstGeom prst="rect">
+              <a:avLst/>
+            </a:prstGeom>
+          </p:spPr>
+        </p:pic>
+        <p:sp>
+          <p:nvSpPr>
+            <p:cNvPr id="73" name="TextBox 72"/>
+            <p:cNvSpPr txBox="1"/>
+            <p:nvPr/>
+          </p:nvSpPr>
+          <p:spPr>
+            <a:xfrm>
+              <a:off x="6123770" y="5222971"/>
+              <a:ext cx="1120382" cy="430887"/>
+            </a:xfrm>
+            <a:prstGeom prst="rect">
+              <a:avLst/>
+            </a:prstGeom>
+            <a:noFill/>
+          </p:spPr>
+          <p:txBody>
+            <a:bodyPr wrap="square" rtlCol="0">
+              <a:spAutoFit/>
+            </a:bodyPr>
+            <a:lstStyle/>
+            <a:p>
+              <a:r>
+                <a:rPr lang="pt-PT" altLang="pt-BR" sz="1100" dirty="0"/>
+                <a:t>Encontrar times para jogar</a:t>
+              </a:r>
+            </a:p>
+          </p:txBody>
+        </p:sp>
+      </p:grpSp>
+      <p:grpSp>
+        <p:nvGrpSpPr>
+          <p:cNvPr id="32" name="Agrupar 31">
+            <a:extLst>
+              <a:ext uri="{FF2B5EF4-FFF2-40B4-BE49-F238E27FC236}">
+                <a16:creationId xmlns:a16="http://schemas.microsoft.com/office/drawing/2014/main" id="{3AEECAEC-4615-4282-85AC-5C45730CB8DF}"/>
+              </a:ext>
+            </a:extLst>
+          </p:cNvPr>
+          <p:cNvGrpSpPr/>
+          <p:nvPr/>
+        </p:nvGrpSpPr>
+        <p:grpSpPr>
+          <a:xfrm>
+            <a:off x="7526982" y="3416067"/>
+            <a:ext cx="1659600" cy="1659600"/>
+            <a:chOff x="7375977" y="3198783"/>
+            <a:chExt cx="1659600" cy="1659600"/>
+          </a:xfrm>
+        </p:grpSpPr>
+        <p:pic>
+          <p:nvPicPr>
+            <p:cNvPr id="2" name="Picture 1" descr="A close up of a logo&#10;&#10;Description generated with very high confidence"/>
+            <p:cNvPicPr>
+              <a:picLocks noChangeAspect="1"/>
+            </p:cNvPicPr>
+            <p:nvPr/>
+          </p:nvPicPr>
+          <p:blipFill>
+            <a:blip r:embed="rId3">
+              <a:extLst>
+                <a:ext uri="{28A0092B-C50C-407E-A947-70E740481C1C}">
+                  <a14:useLocalDpi xmlns:a14="http://schemas.microsoft.com/office/drawing/2010/main" val="0"/>
+                </a:ext>
+              </a:extLst>
+            </a:blip>
+            <a:stretch>
+              <a:fillRect/>
+            </a:stretch>
+          </p:blipFill>
+          <p:spPr>
+            <a:xfrm>
+              <a:off x="7375977" y="3198783"/>
+              <a:ext cx="1659600" cy="1659600"/>
+            </a:xfrm>
+            <a:prstGeom prst="rect">
+              <a:avLst/>
+            </a:prstGeom>
+          </p:spPr>
+        </p:pic>
+        <p:sp>
+          <p:nvSpPr>
+            <p:cNvPr id="3" name="TextBox 65"/>
+            <p:cNvSpPr txBox="1"/>
+            <p:nvPr/>
+          </p:nvSpPr>
+          <p:spPr>
+            <a:xfrm>
+              <a:off x="7690426" y="3519646"/>
+              <a:ext cx="1120382" cy="600164"/>
+            </a:xfrm>
+            <a:prstGeom prst="rect">
+              <a:avLst/>
+            </a:prstGeom>
+            <a:noFill/>
+          </p:spPr>
+          <p:txBody>
+            <a:bodyPr wrap="square" rtlCol="0">
+              <a:spAutoFit/>
+            </a:bodyPr>
+            <a:lstStyle/>
+            <a:p>
+              <a:r>
+                <a:rPr lang="pt-PT" altLang="pt-BR" sz="1100" dirty="0"/>
+                <a:t>Incentiva as pessoas a seu redor a jogar</a:t>
+              </a:r>
+            </a:p>
+          </p:txBody>
+        </p:sp>
+      </p:grpSp>
+      <p:grpSp>
+        <p:nvGrpSpPr>
+          <p:cNvPr id="29" name="Agrupar 28">
+            <a:extLst>
+              <a:ext uri="{FF2B5EF4-FFF2-40B4-BE49-F238E27FC236}">
+                <a16:creationId xmlns:a16="http://schemas.microsoft.com/office/drawing/2014/main" id="{BC906E1E-A532-49E2-9464-6548CBDF1986}"/>
+              </a:ext>
+            </a:extLst>
+          </p:cNvPr>
+          <p:cNvGrpSpPr/>
+          <p:nvPr/>
+        </p:nvGrpSpPr>
+        <p:grpSpPr>
+          <a:xfrm>
+            <a:off x="9004288" y="1576873"/>
+            <a:ext cx="1659600" cy="1659600"/>
+            <a:chOff x="8596630" y="960075"/>
+            <a:chExt cx="1659600" cy="1659600"/>
+          </a:xfrm>
+        </p:grpSpPr>
+        <p:pic>
+          <p:nvPicPr>
+            <p:cNvPr id="9" name="Picture 8" descr="A close up of a logo&#10;&#10;Description generated with very high confidence"/>
+            <p:cNvPicPr>
+              <a:picLocks noChangeAspect="1"/>
+            </p:cNvPicPr>
+            <p:nvPr/>
+          </p:nvPicPr>
+          <p:blipFill>
+            <a:blip r:embed="rId3">
+              <a:extLst>
+                <a:ext uri="{28A0092B-C50C-407E-A947-70E740481C1C}">
+                  <a14:useLocalDpi xmlns:a14="http://schemas.microsoft.com/office/drawing/2010/main" val="0"/>
+                </a:ext>
+              </a:extLst>
+            </a:blip>
+            <a:stretch>
+              <a:fillRect/>
+            </a:stretch>
+          </p:blipFill>
+          <p:spPr>
+            <a:xfrm>
+              <a:off x="8596630" y="960075"/>
+              <a:ext cx="1659600" cy="1659600"/>
+            </a:xfrm>
+            <a:prstGeom prst="rect">
+              <a:avLst/>
+            </a:prstGeom>
+          </p:spPr>
+        </p:pic>
+        <p:sp>
+          <p:nvSpPr>
+            <p:cNvPr id="10" name="TextBox 61"/>
+            <p:cNvSpPr txBox="1"/>
+            <p:nvPr/>
+          </p:nvSpPr>
+          <p:spPr>
+            <a:xfrm>
+              <a:off x="8854061" y="1235877"/>
+              <a:ext cx="1231231" cy="938719"/>
+            </a:xfrm>
+            <a:prstGeom prst="rect">
+              <a:avLst/>
+            </a:prstGeom>
+            <a:noFill/>
+          </p:spPr>
+          <p:txBody>
+            <a:bodyPr wrap="square" rtlCol="0">
+              <a:spAutoFit/>
+            </a:bodyPr>
+            <a:lstStyle/>
+            <a:p>
+              <a:r>
+                <a:rPr lang="pt-PT" altLang="pt-BR" sz="1100" dirty="0"/>
+                <a:t>Mercado tentando manter o usuário através de atualizações e expansões</a:t>
+              </a:r>
+            </a:p>
+          </p:txBody>
+        </p:sp>
+      </p:grpSp>
+      <p:grpSp>
+        <p:nvGrpSpPr>
+          <p:cNvPr id="74" name="Agrupar 73">
+            <a:extLst>
+              <a:ext uri="{FF2B5EF4-FFF2-40B4-BE49-F238E27FC236}">
+                <a16:creationId xmlns:a16="http://schemas.microsoft.com/office/drawing/2014/main" id="{FA44B570-9D82-4844-A2FC-46944AA9818B}"/>
+              </a:ext>
+            </a:extLst>
+          </p:cNvPr>
+          <p:cNvGrpSpPr/>
+          <p:nvPr/>
+        </p:nvGrpSpPr>
+        <p:grpSpPr>
+          <a:xfrm>
+            <a:off x="1546909" y="1688225"/>
+            <a:ext cx="1659600" cy="1659600"/>
+            <a:chOff x="1510988" y="1284082"/>
+            <a:chExt cx="1659600" cy="1659600"/>
+          </a:xfrm>
+        </p:grpSpPr>
+        <p:pic>
+          <p:nvPicPr>
+            <p:cNvPr id="11" name="Picture 10" descr="A close up of a logo&#10;&#10;Description generated with very high confidence"/>
+            <p:cNvPicPr>
+              <a:picLocks noChangeAspect="1"/>
+            </p:cNvPicPr>
+            <p:nvPr/>
+          </p:nvPicPr>
+          <p:blipFill>
+            <a:blip r:embed="rId3">
+              <a:extLst>
+                <a:ext uri="{28A0092B-C50C-407E-A947-70E740481C1C}">
+                  <a14:useLocalDpi xmlns:a14="http://schemas.microsoft.com/office/drawing/2010/main" val="0"/>
+                </a:ext>
+              </a:extLst>
+            </a:blip>
+            <a:stretch>
+              <a:fillRect/>
+            </a:stretch>
+          </p:blipFill>
+          <p:spPr>
+            <a:xfrm>
+              <a:off x="1510988" y="1284082"/>
+              <a:ext cx="1659600" cy="1659600"/>
+            </a:xfrm>
+            <a:prstGeom prst="rect">
+              <a:avLst/>
+            </a:prstGeom>
+          </p:spPr>
+        </p:pic>
+        <p:sp>
+          <p:nvSpPr>
+            <p:cNvPr id="12" name="TextBox 59"/>
+            <p:cNvSpPr txBox="1"/>
+            <p:nvPr/>
+          </p:nvSpPr>
+          <p:spPr>
+            <a:xfrm>
+              <a:off x="1837271" y="1618577"/>
+              <a:ext cx="1120382" cy="430887"/>
+            </a:xfrm>
+            <a:prstGeom prst="rect">
+              <a:avLst/>
+            </a:prstGeom>
+            <a:noFill/>
+          </p:spPr>
+          <p:txBody>
+            <a:bodyPr wrap="square" rtlCol="0">
+              <a:spAutoFit/>
+            </a:bodyPr>
+            <a:lstStyle/>
+            <a:p>
+              <a:r>
+                <a:rPr lang="pt-PT" altLang="en-US" sz="1100" dirty="0"/>
+                <a:t>Recomendações e dicas</a:t>
+              </a:r>
+            </a:p>
+          </p:txBody>
+        </p:sp>
+      </p:grpSp>
+      <p:grpSp>
+        <p:nvGrpSpPr>
+          <p:cNvPr id="27" name="Agrupar 26">
+            <a:extLst>
+              <a:ext uri="{FF2B5EF4-FFF2-40B4-BE49-F238E27FC236}">
+                <a16:creationId xmlns:a16="http://schemas.microsoft.com/office/drawing/2014/main" id="{3DDFA7C5-D186-414E-A85E-8580AF93D153}"/>
+              </a:ext>
+            </a:extLst>
+          </p:cNvPr>
+          <p:cNvGrpSpPr/>
+          <p:nvPr/>
+        </p:nvGrpSpPr>
+        <p:grpSpPr>
+          <a:xfrm>
+            <a:off x="7913670" y="-181989"/>
+            <a:ext cx="1659600" cy="1659600"/>
+            <a:chOff x="7910345" y="-324727"/>
+            <a:chExt cx="1659600" cy="1659600"/>
+          </a:xfrm>
+        </p:grpSpPr>
+        <p:pic>
+          <p:nvPicPr>
+            <p:cNvPr id="13" name="Picture 12" descr="A close up of a logo&#10;&#10;Description generated with very high confidence"/>
+            <p:cNvPicPr>
+              <a:picLocks noChangeAspect="1"/>
+            </p:cNvPicPr>
+            <p:nvPr/>
+          </p:nvPicPr>
+          <p:blipFill>
+            <a:blip r:embed="rId3">
+              <a:extLst>
+                <a:ext uri="{28A0092B-C50C-407E-A947-70E740481C1C}">
+                  <a14:useLocalDpi xmlns:a14="http://schemas.microsoft.com/office/drawing/2010/main" val="0"/>
+                </a:ext>
+              </a:extLst>
+            </a:blip>
+            <a:stretch>
+              <a:fillRect/>
+            </a:stretch>
+          </p:blipFill>
+          <p:spPr>
+            <a:xfrm>
+              <a:off x="7910345" y="-324727"/>
+              <a:ext cx="1659600" cy="1659600"/>
+            </a:xfrm>
+            <a:prstGeom prst="rect">
+              <a:avLst/>
+            </a:prstGeom>
+          </p:spPr>
+        </p:pic>
+        <p:sp>
+          <p:nvSpPr>
+            <p:cNvPr id="14" name="TextBox 57"/>
+            <p:cNvSpPr txBox="1"/>
+            <p:nvPr/>
+          </p:nvSpPr>
+          <p:spPr>
+            <a:xfrm>
+              <a:off x="8232673" y="31248"/>
+              <a:ext cx="977823" cy="769441"/>
+            </a:xfrm>
+            <a:prstGeom prst="rect">
+              <a:avLst/>
+            </a:prstGeom>
+            <a:noFill/>
+          </p:spPr>
+          <p:txBody>
+            <a:bodyPr wrap="square" rtlCol="0">
+              <a:spAutoFit/>
+            </a:bodyPr>
+            <a:lstStyle/>
+            <a:p>
+              <a:r>
+                <a:rPr lang="pt-PT" altLang="en-US" sz="1100" dirty="0"/>
+                <a:t>Preciso de mais tempo para fazer o que gosto</a:t>
+              </a:r>
+            </a:p>
+          </p:txBody>
+        </p:sp>
+      </p:grpSp>
+      <p:grpSp>
+        <p:nvGrpSpPr>
+          <p:cNvPr id="80" name="Agrupar 79">
+            <a:extLst>
+              <a:ext uri="{FF2B5EF4-FFF2-40B4-BE49-F238E27FC236}">
+                <a16:creationId xmlns:a16="http://schemas.microsoft.com/office/drawing/2014/main" id="{D64809B8-3271-4E57-A640-FBACAC1A68DB}"/>
+              </a:ext>
+            </a:extLst>
+          </p:cNvPr>
+          <p:cNvGrpSpPr/>
+          <p:nvPr/>
+        </p:nvGrpSpPr>
+        <p:grpSpPr>
+          <a:xfrm>
+            <a:off x="7598874" y="5031826"/>
+            <a:ext cx="1659600" cy="1659600"/>
+            <a:chOff x="7366373" y="4835974"/>
+            <a:chExt cx="1659600" cy="1659600"/>
+          </a:xfrm>
+        </p:grpSpPr>
+        <p:pic>
+          <p:nvPicPr>
+            <p:cNvPr id="54" name="Picture 53" descr="A close up of a logo&#10;&#10;Description generated with very high confidence"/>
+            <p:cNvPicPr>
+              <a:picLocks noChangeAspect="1"/>
+            </p:cNvPicPr>
+            <p:nvPr/>
+          </p:nvPicPr>
+          <p:blipFill>
+            <a:blip r:embed="rId3">
+              <a:extLst>
+                <a:ext uri="{28A0092B-C50C-407E-A947-70E740481C1C}">
+                  <a14:useLocalDpi xmlns:a14="http://schemas.microsoft.com/office/drawing/2010/main" val="0"/>
+                </a:ext>
+              </a:extLst>
+            </a:blip>
+            <a:stretch>
+              <a:fillRect/>
+            </a:stretch>
+          </p:blipFill>
+          <p:spPr>
+            <a:xfrm>
+              <a:off x="7366373" y="4835974"/>
+              <a:ext cx="1659600" cy="1659600"/>
+            </a:xfrm>
+            <a:prstGeom prst="rect">
+              <a:avLst/>
+            </a:prstGeom>
+          </p:spPr>
+        </p:pic>
+        <p:sp>
+          <p:nvSpPr>
+            <p:cNvPr id="16" name="TextBox 72"/>
+            <p:cNvSpPr txBox="1"/>
+            <p:nvPr/>
+          </p:nvSpPr>
+          <p:spPr>
+            <a:xfrm>
+              <a:off x="7636562" y="5148821"/>
+              <a:ext cx="1117902" cy="769441"/>
+            </a:xfrm>
+            <a:prstGeom prst="rect">
+              <a:avLst/>
+            </a:prstGeom>
+            <a:noFill/>
+          </p:spPr>
+          <p:txBody>
+            <a:bodyPr wrap="square" rtlCol="0">
+              <a:spAutoFit/>
+            </a:bodyPr>
+            <a:lstStyle/>
+            <a:p>
+              <a:r>
+                <a:rPr lang="pt-PT" altLang="pt-BR" sz="1100" dirty="0"/>
+                <a:t>Uma máquina em que consiga ter uma melhor performance</a:t>
+              </a:r>
+            </a:p>
+          </p:txBody>
+        </p:sp>
+      </p:grpSp>
+      <p:grpSp>
+        <p:nvGrpSpPr>
+          <p:cNvPr id="81" name="Agrupar 80">
+            <a:extLst>
+              <a:ext uri="{FF2B5EF4-FFF2-40B4-BE49-F238E27FC236}">
+                <a16:creationId xmlns:a16="http://schemas.microsoft.com/office/drawing/2014/main" id="{2C681B61-48F3-4647-A97F-68A27C0880DB}"/>
+              </a:ext>
+            </a:extLst>
+          </p:cNvPr>
+          <p:cNvGrpSpPr/>
+          <p:nvPr/>
+        </p:nvGrpSpPr>
+        <p:grpSpPr>
+          <a:xfrm>
+            <a:off x="9122831" y="5033010"/>
+            <a:ext cx="1659600" cy="1659600"/>
+            <a:chOff x="8907851" y="4783652"/>
+            <a:chExt cx="1659600" cy="1659600"/>
+          </a:xfrm>
+        </p:grpSpPr>
+        <p:pic>
+          <p:nvPicPr>
+            <p:cNvPr id="55" name="Picture 54" descr="A close up of a logo&#10;&#10;Description generated with very high confidence"/>
+            <p:cNvPicPr>
+              <a:picLocks noChangeAspect="1"/>
+            </p:cNvPicPr>
+            <p:nvPr/>
+          </p:nvPicPr>
+          <p:blipFill>
+            <a:blip r:embed="rId3">
+              <a:extLst>
+                <a:ext uri="{28A0092B-C50C-407E-A947-70E740481C1C}">
+                  <a14:useLocalDpi xmlns:a14="http://schemas.microsoft.com/office/drawing/2010/main" val="0"/>
+                </a:ext>
+              </a:extLst>
+            </a:blip>
+            <a:stretch>
+              <a:fillRect/>
+            </a:stretch>
+          </p:blipFill>
+          <p:spPr>
+            <a:xfrm>
+              <a:off x="8907851" y="4783652"/>
+              <a:ext cx="1659600" cy="1659600"/>
+            </a:xfrm>
+            <a:prstGeom prst="rect">
+              <a:avLst/>
+            </a:prstGeom>
+          </p:spPr>
+        </p:pic>
+        <p:sp>
+          <p:nvSpPr>
+            <p:cNvPr id="17" name="TextBox 72"/>
+            <p:cNvSpPr txBox="1"/>
+            <p:nvPr/>
+          </p:nvSpPr>
+          <p:spPr>
+            <a:xfrm>
+              <a:off x="9225855" y="5131743"/>
+              <a:ext cx="1120382" cy="430887"/>
+            </a:xfrm>
+            <a:prstGeom prst="rect">
+              <a:avLst/>
+            </a:prstGeom>
+            <a:noFill/>
+          </p:spPr>
+          <p:txBody>
+            <a:bodyPr wrap="square" rtlCol="0">
+              <a:spAutoFit/>
+            </a:bodyPr>
+            <a:lstStyle/>
+            <a:p>
+              <a:r>
+                <a:rPr lang="pt-PT" altLang="pt-BR" sz="1100" dirty="0"/>
+                <a:t>Ambiente silencioso</a:t>
+              </a:r>
+            </a:p>
+          </p:txBody>
+        </p:sp>
+      </p:grpSp>
+      <p:grpSp>
+        <p:nvGrpSpPr>
+          <p:cNvPr id="82" name="Agrupar 81">
+            <a:extLst>
+              <a:ext uri="{FF2B5EF4-FFF2-40B4-BE49-F238E27FC236}">
+                <a16:creationId xmlns:a16="http://schemas.microsoft.com/office/drawing/2014/main" id="{EA129AAA-91B6-4602-84C4-B6F1B957D46E}"/>
+              </a:ext>
+            </a:extLst>
+          </p:cNvPr>
+          <p:cNvGrpSpPr/>
+          <p:nvPr/>
+        </p:nvGrpSpPr>
+        <p:grpSpPr>
+          <a:xfrm>
+            <a:off x="10643007" y="5033010"/>
+            <a:ext cx="1659600" cy="1659600"/>
+            <a:chOff x="10476936" y="4814767"/>
+            <a:chExt cx="1659600" cy="1659600"/>
+          </a:xfrm>
+        </p:grpSpPr>
+        <p:pic>
+          <p:nvPicPr>
+            <p:cNvPr id="18" name="Picture 17" descr="A close up of a logo&#10;&#10;Description generated with very high confidence"/>
+            <p:cNvPicPr>
+              <a:picLocks noChangeAspect="1"/>
+            </p:cNvPicPr>
+            <p:nvPr/>
+          </p:nvPicPr>
+          <p:blipFill>
+            <a:blip r:embed="rId3">
+              <a:extLst>
+                <a:ext uri="{28A0092B-C50C-407E-A947-70E740481C1C}">
+                  <a14:useLocalDpi xmlns:a14="http://schemas.microsoft.com/office/drawing/2010/main" val="0"/>
+                </a:ext>
+              </a:extLst>
+            </a:blip>
+            <a:stretch>
+              <a:fillRect/>
+            </a:stretch>
+          </p:blipFill>
+          <p:spPr>
+            <a:xfrm>
+              <a:off x="10476936" y="4814767"/>
+              <a:ext cx="1659600" cy="1659600"/>
+            </a:xfrm>
+            <a:prstGeom prst="rect">
+              <a:avLst/>
+            </a:prstGeom>
+          </p:spPr>
+        </p:pic>
+        <p:sp>
+          <p:nvSpPr>
+            <p:cNvPr id="22" name="TextBox 72"/>
+            <p:cNvSpPr txBox="1"/>
+            <p:nvPr/>
+          </p:nvSpPr>
+          <p:spPr>
+            <a:xfrm>
+              <a:off x="10746545" y="5138332"/>
+              <a:ext cx="1120382" cy="600164"/>
+            </a:xfrm>
+            <a:prstGeom prst="rect">
+              <a:avLst/>
+            </a:prstGeom>
+            <a:noFill/>
+          </p:spPr>
+          <p:txBody>
+            <a:bodyPr wrap="square" rtlCol="0">
+              <a:spAutoFit/>
+            </a:bodyPr>
+            <a:lstStyle/>
+            <a:p>
+              <a:r>
+                <a:rPr lang="pt-PT" altLang="pt-BR" sz="1100" dirty="0"/>
+                <a:t>Otimizar melhor seu tempo disponível</a:t>
+              </a:r>
+            </a:p>
+          </p:txBody>
+        </p:sp>
+      </p:grpSp>
       <p:pic>
         <p:nvPicPr>
           <p:cNvPr id="26" name="Picture 25" descr="Untitled Diagram"/>
@@ -5048,14 +5491,14 @@
           <p:nvPr/>
         </p:nvPicPr>
         <p:blipFill>
-          <a:blip r:embed="rId2"/>
+          <a:blip r:embed="rId4"/>
           <a:stretch>
             <a:fillRect/>
           </a:stretch>
         </p:blipFill>
         <p:spPr>
           <a:xfrm>
-            <a:off x="5208905" y="1553845"/>
+            <a:off x="5190763" y="1523616"/>
             <a:ext cx="1800225" cy="1800225"/>
           </a:xfrm>
           <a:prstGeom prst="rect">
@@ -5322,6 +5765,8 @@
       </a:bgFillStyleLst>
     </a:fmtScheme>
   </a:themeElements>
+  <a:objectDefaults/>
+  <a:extraClrSchemeLst/>
   <a:extLst>
     <a:ext uri="{05A4C25C-085E-4340-85A3-A5531E510DB2}">
       <thm15:themeFamily xmlns:thm15="http://schemas.microsoft.com/office/thememl/2012/main" name="Office Theme" id="{62F939B6-93AF-4DB8-9C6B-D6C7DFDC589F}" vid="{4A3C46E8-61CC-4603-A589-7422A47A8E4A}"/>
@@ -5581,6 +6026,8 @@
       </a:bgFillStyleLst>
     </a:fmtScheme>
   </a:themeElements>
+  <a:objectDefaults/>
+  <a:extraClrSchemeLst/>
   <a:extLst>
     <a:ext uri="{05A4C25C-085E-4340-85A3-A5531E510DB2}">
       <thm15:themeFamily xmlns:thm15="http://schemas.microsoft.com/office/thememl/2012/main" name="Office Theme" id="{62F939B6-93AF-4DB8-9C6B-D6C7DFDC589F}" vid="{4A3C46E8-61CC-4603-A589-7422A47A8E4A}"/>

</xml_diff>